<commit_message>
commit to push pro abc.
</commit_message>
<xml_diff>
--- a/Tech_assignment_slides.pptx
+++ b/Tech_assignment_slides.pptx
@@ -7,8 +7,11 @@
   <p:sldIdLst>
     <p:sldId id="256" r:id="rId2"/>
     <p:sldId id="257" r:id="rId3"/>
-    <p:sldId id="258" r:id="rId4"/>
-    <p:sldId id="259" r:id="rId5"/>
+    <p:sldId id="260" r:id="rId4"/>
+    <p:sldId id="261" r:id="rId5"/>
+    <p:sldId id="258" r:id="rId6"/>
+    <p:sldId id="259" r:id="rId7"/>
+    <p:sldId id="262" r:id="rId8"/>
   </p:sldIdLst>
   <p:sldSz cx="12192000" cy="6858000"/>
   <p:notesSz cx="6858000" cy="9144000"/>
@@ -107,6 +110,11 @@
       </a:defRPr>
     </a:lvl9pPr>
   </p:defaultTextStyle>
+  <p:extLst>
+    <p:ext uri="{EFAFB233-063F-42B5-8137-9DF3F51BA10A}">
+      <p15:sldGuideLst xmlns:p15="http://schemas.microsoft.com/office/powerpoint/2012/main"/>
+    </p:ext>
+  </p:extLst>
 </p:presentation>
 </file>
 
@@ -259,7 +267,7 @@
           <a:p>
             <a:fld id="{3BA1146D-69C8-4774-A895-81521A170E8E}" type="datetimeFigureOut">
               <a:rPr lang="en-GB" smtClean="0"/>
-              <a:t>07/12/2023</a:t>
+              <a:t>10/12/2023</a:t>
             </a:fld>
             <a:endParaRPr lang="en-GB"/>
           </a:p>
@@ -459,7 +467,7 @@
           <a:p>
             <a:fld id="{3BA1146D-69C8-4774-A895-81521A170E8E}" type="datetimeFigureOut">
               <a:rPr lang="en-GB" smtClean="0"/>
-              <a:t>07/12/2023</a:t>
+              <a:t>10/12/2023</a:t>
             </a:fld>
             <a:endParaRPr lang="en-GB"/>
           </a:p>
@@ -669,7 +677,7 @@
           <a:p>
             <a:fld id="{3BA1146D-69C8-4774-A895-81521A170E8E}" type="datetimeFigureOut">
               <a:rPr lang="en-GB" smtClean="0"/>
-              <a:t>07/12/2023</a:t>
+              <a:t>10/12/2023</a:t>
             </a:fld>
             <a:endParaRPr lang="en-GB"/>
           </a:p>
@@ -869,7 +877,7 @@
           <a:p>
             <a:fld id="{3BA1146D-69C8-4774-A895-81521A170E8E}" type="datetimeFigureOut">
               <a:rPr lang="en-GB" smtClean="0"/>
-              <a:t>07/12/2023</a:t>
+              <a:t>10/12/2023</a:t>
             </a:fld>
             <a:endParaRPr lang="en-GB"/>
           </a:p>
@@ -1145,7 +1153,7 @@
           <a:p>
             <a:fld id="{3BA1146D-69C8-4774-A895-81521A170E8E}" type="datetimeFigureOut">
               <a:rPr lang="en-GB" smtClean="0"/>
-              <a:t>07/12/2023</a:t>
+              <a:t>10/12/2023</a:t>
             </a:fld>
             <a:endParaRPr lang="en-GB"/>
           </a:p>
@@ -1413,7 +1421,7 @@
           <a:p>
             <a:fld id="{3BA1146D-69C8-4774-A895-81521A170E8E}" type="datetimeFigureOut">
               <a:rPr lang="en-GB" smtClean="0"/>
-              <a:t>07/12/2023</a:t>
+              <a:t>10/12/2023</a:t>
             </a:fld>
             <a:endParaRPr lang="en-GB"/>
           </a:p>
@@ -1828,7 +1836,7 @@
           <a:p>
             <a:fld id="{3BA1146D-69C8-4774-A895-81521A170E8E}" type="datetimeFigureOut">
               <a:rPr lang="en-GB" smtClean="0"/>
-              <a:t>07/12/2023</a:t>
+              <a:t>10/12/2023</a:t>
             </a:fld>
             <a:endParaRPr lang="en-GB"/>
           </a:p>
@@ -1970,7 +1978,7 @@
           <a:p>
             <a:fld id="{3BA1146D-69C8-4774-A895-81521A170E8E}" type="datetimeFigureOut">
               <a:rPr lang="en-GB" smtClean="0"/>
-              <a:t>07/12/2023</a:t>
+              <a:t>10/12/2023</a:t>
             </a:fld>
             <a:endParaRPr lang="en-GB"/>
           </a:p>
@@ -2083,7 +2091,7 @@
           <a:p>
             <a:fld id="{3BA1146D-69C8-4774-A895-81521A170E8E}" type="datetimeFigureOut">
               <a:rPr lang="en-GB" smtClean="0"/>
-              <a:t>07/12/2023</a:t>
+              <a:t>10/12/2023</a:t>
             </a:fld>
             <a:endParaRPr lang="en-GB"/>
           </a:p>
@@ -2396,7 +2404,7 @@
           <a:p>
             <a:fld id="{3BA1146D-69C8-4774-A895-81521A170E8E}" type="datetimeFigureOut">
               <a:rPr lang="en-GB" smtClean="0"/>
-              <a:t>07/12/2023</a:t>
+              <a:t>10/12/2023</a:t>
             </a:fld>
             <a:endParaRPr lang="en-GB"/>
           </a:p>
@@ -2685,7 +2693,7 @@
           <a:p>
             <a:fld id="{3BA1146D-69C8-4774-A895-81521A170E8E}" type="datetimeFigureOut">
               <a:rPr lang="en-GB" smtClean="0"/>
-              <a:t>07/12/2023</a:t>
+              <a:t>10/12/2023</a:t>
             </a:fld>
             <a:endParaRPr lang="en-GB"/>
           </a:p>
@@ -2928,7 +2936,7 @@
           <a:p>
             <a:fld id="{3BA1146D-69C8-4774-A895-81521A170E8E}" type="datetimeFigureOut">
               <a:rPr lang="en-GB" smtClean="0"/>
-              <a:t>07/12/2023</a:t>
+              <a:t>10/12/2023</a:t>
             </a:fld>
             <a:endParaRPr lang="en-GB"/>
           </a:p>
@@ -3462,10 +3470,10 @@
       </p:sp>
       <p:pic>
         <p:nvPicPr>
-          <p:cNvPr id="5" name="Content Placeholder 4">
-            <a:extLst>
-              <a:ext uri="{FF2B5EF4-FFF2-40B4-BE49-F238E27FC236}">
-                <a16:creationId xmlns:a16="http://schemas.microsoft.com/office/drawing/2014/main" id="{D434FFC4-AD02-D7D9-85C6-D6360548900F}"/>
+          <p:cNvPr id="7" name="Content Placeholder 6">
+            <a:extLst>
+              <a:ext uri="{FF2B5EF4-FFF2-40B4-BE49-F238E27FC236}">
+                <a16:creationId xmlns:a16="http://schemas.microsoft.com/office/drawing/2014/main" id="{17AB71E9-BDE9-D26A-7937-0C791F52EBC7}"/>
               </a:ext>
             </a:extLst>
           </p:cNvPr>
@@ -3484,16 +3492,338 @@
               </a:ext>
             </a:extLst>
           </a:blip>
-          <a:srcRect l="16158" r="48890"/>
+          <a:srcRect l="27331" r="1293"/>
           <a:stretch/>
         </p:blipFill>
         <p:spPr>
           <a:xfrm>
-            <a:off x="482600" y="1690688"/>
-            <a:ext cx="3255861" cy="4292600"/>
+            <a:off x="4709236" y="1718762"/>
+            <a:ext cx="4588086" cy="2962131"/>
           </a:xfrm>
+          <a:ln w="38100"/>
+        </p:spPr>
+        <p:style>
+          <a:lnRef idx="2">
+            <a:schemeClr val="dk1"/>
+          </a:lnRef>
+          <a:fillRef idx="1">
+            <a:schemeClr val="lt1"/>
+          </a:fillRef>
+          <a:effectRef idx="0">
+            <a:schemeClr val="dk1"/>
+          </a:effectRef>
+          <a:fontRef idx="minor">
+            <a:schemeClr val="dk1"/>
+          </a:fontRef>
+        </p:style>
+      </p:pic>
+      <p:pic>
+        <p:nvPicPr>
+          <p:cNvPr id="9" name="Picture 8">
+            <a:extLst>
+              <a:ext uri="{FF2B5EF4-FFF2-40B4-BE49-F238E27FC236}">
+                <a16:creationId xmlns:a16="http://schemas.microsoft.com/office/drawing/2014/main" id="{F0264652-A4C9-78B3-3767-040D47E3CCAE}"/>
+              </a:ext>
+            </a:extLst>
+          </p:cNvPr>
+          <p:cNvPicPr>
+            <a:picLocks noChangeAspect="1"/>
+          </p:cNvPicPr>
+          <p:nvPr/>
+        </p:nvPicPr>
+        <p:blipFill rotWithShape="1">
+          <a:blip r:embed="rId3">
+            <a:extLst>
+              <a:ext uri="{28A0092B-C50C-407E-A947-70E740481C1C}">
+                <a14:useLocalDpi xmlns:a14="http://schemas.microsoft.com/office/drawing/2010/main" val="0"/>
+              </a:ext>
+            </a:extLst>
+          </a:blip>
+          <a:srcRect l="31525" r="31040"/>
+          <a:stretch/>
+        </p:blipFill>
+        <p:spPr>
+          <a:xfrm>
+            <a:off x="445333" y="1690688"/>
+            <a:ext cx="3708971" cy="4565581"/>
+          </a:xfrm>
+          <a:prstGeom prst="rect">
+            <a:avLst/>
+          </a:prstGeom>
         </p:spPr>
       </p:pic>
+      <p:sp>
+        <p:nvSpPr>
+          <p:cNvPr id="11" name="TextBox 10">
+            <a:extLst>
+              <a:ext uri="{FF2B5EF4-FFF2-40B4-BE49-F238E27FC236}">
+                <a16:creationId xmlns:a16="http://schemas.microsoft.com/office/drawing/2014/main" id="{BE289E83-48F9-5BD6-C91E-A296232F805E}"/>
+              </a:ext>
+            </a:extLst>
+          </p:cNvPr>
+          <p:cNvSpPr txBox="1"/>
+          <p:nvPr/>
+        </p:nvSpPr>
+        <p:spPr>
+          <a:xfrm>
+            <a:off x="4554996" y="4890756"/>
+            <a:ext cx="3848426" cy="1200329"/>
+          </a:xfrm>
+          <a:prstGeom prst="rect">
+            <a:avLst/>
+          </a:prstGeom>
+          <a:noFill/>
+        </p:spPr>
+        <p:txBody>
+          <a:bodyPr wrap="none" rtlCol="0">
+            <a:spAutoFit/>
+          </a:bodyPr>
+          <a:lstStyle/>
+          <a:p>
+            <a:r>
+              <a:rPr lang="en-US" sz="2400" dirty="0" err="1"/>
+              <a:t>pro_a</a:t>
+            </a:r>
+            <a:r>
+              <a:rPr lang="en-US" sz="2400" dirty="0"/>
+              <a:t>: S1 spike protein (blue)</a:t>
+            </a:r>
+          </a:p>
+          <a:p>
+            <a:r>
+              <a:rPr lang="en-US" sz="2400" dirty="0" err="1"/>
+              <a:t>pro_b</a:t>
+            </a:r>
+            <a:r>
+              <a:rPr lang="en-US" sz="2400" dirty="0"/>
+              <a:t>: Ab P5A 3C8 (red)</a:t>
+            </a:r>
+          </a:p>
+          <a:p>
+            <a:r>
+              <a:rPr lang="en-US" sz="2400" dirty="0" err="1"/>
+              <a:t>pro_c</a:t>
+            </a:r>
+            <a:r>
+              <a:rPr lang="en-US" sz="2400" dirty="0"/>
+              <a:t>: ACE2 (grey)</a:t>
+            </a:r>
+            <a:endParaRPr lang="en-GB" sz="2400" dirty="0"/>
+          </a:p>
+        </p:txBody>
+      </p:sp>
+      <p:sp>
+        <p:nvSpPr>
+          <p:cNvPr id="13" name="TextBox 12">
+            <a:extLst>
+              <a:ext uri="{FF2B5EF4-FFF2-40B4-BE49-F238E27FC236}">
+                <a16:creationId xmlns:a16="http://schemas.microsoft.com/office/drawing/2014/main" id="{07F7C3A7-BBBB-C5D0-C229-251229FBB094}"/>
+              </a:ext>
+            </a:extLst>
+          </p:cNvPr>
+          <p:cNvSpPr txBox="1"/>
+          <p:nvPr/>
+        </p:nvSpPr>
+        <p:spPr>
+          <a:xfrm>
+            <a:off x="302967" y="6426016"/>
+            <a:ext cx="6096000" cy="369332"/>
+          </a:xfrm>
+          <a:prstGeom prst="rect">
+            <a:avLst/>
+          </a:prstGeom>
+          <a:noFill/>
+        </p:spPr>
+        <p:txBody>
+          <a:bodyPr wrap="square">
+            <a:spAutoFit/>
+          </a:bodyPr>
+          <a:lstStyle/>
+          <a:p>
+            <a:r>
+              <a:rPr lang="en-GB"/>
+              <a:t>https://www.rcsb.org/structure/6m0j</a:t>
+            </a:r>
+            <a:endParaRPr lang="en-GB" dirty="0"/>
+          </a:p>
+        </p:txBody>
+      </p:sp>
+      <p:sp>
+        <p:nvSpPr>
+          <p:cNvPr id="15" name="TextBox 14">
+            <a:extLst>
+              <a:ext uri="{FF2B5EF4-FFF2-40B4-BE49-F238E27FC236}">
+                <a16:creationId xmlns:a16="http://schemas.microsoft.com/office/drawing/2014/main" id="{7167D946-1F7F-4125-6D79-E85274759112}"/>
+              </a:ext>
+            </a:extLst>
+          </p:cNvPr>
+          <p:cNvSpPr txBox="1"/>
+          <p:nvPr/>
+        </p:nvSpPr>
+        <p:spPr>
+          <a:xfrm>
+            <a:off x="4154304" y="6426016"/>
+            <a:ext cx="6096000" cy="369332"/>
+          </a:xfrm>
+          <a:prstGeom prst="rect">
+            <a:avLst/>
+          </a:prstGeom>
+          <a:noFill/>
+        </p:spPr>
+        <p:txBody>
+          <a:bodyPr wrap="square">
+            <a:spAutoFit/>
+          </a:bodyPr>
+          <a:lstStyle/>
+          <a:p>
+            <a:r>
+              <a:rPr lang="en-GB" dirty="0"/>
+              <a:t>https://www.rcsb.org/structure/7Z0X</a:t>
+            </a:r>
+          </a:p>
+        </p:txBody>
+      </p:sp>
+      <p:grpSp>
+        <p:nvGrpSpPr>
+          <p:cNvPr id="20" name="Group 19">
+            <a:extLst>
+              <a:ext uri="{FF2B5EF4-FFF2-40B4-BE49-F238E27FC236}">
+                <a16:creationId xmlns:a16="http://schemas.microsoft.com/office/drawing/2014/main" id="{32105C00-37FA-0DA8-BCA2-F9A69907BEC5}"/>
+              </a:ext>
+            </a:extLst>
+          </p:cNvPr>
+          <p:cNvGrpSpPr/>
+          <p:nvPr/>
+        </p:nvGrpSpPr>
+        <p:grpSpPr>
+          <a:xfrm>
+            <a:off x="846025" y="1690688"/>
+            <a:ext cx="3863211" cy="2990205"/>
+            <a:chOff x="846025" y="1690688"/>
+            <a:chExt cx="3863211" cy="2990205"/>
+          </a:xfrm>
+        </p:grpSpPr>
+        <p:sp>
+          <p:nvSpPr>
+            <p:cNvPr id="10" name="Rectangle 9">
+              <a:extLst>
+                <a:ext uri="{FF2B5EF4-FFF2-40B4-BE49-F238E27FC236}">
+                  <a16:creationId xmlns:a16="http://schemas.microsoft.com/office/drawing/2014/main" id="{7A89FBAE-1A41-1241-FEE6-06A2E8E7F03B}"/>
+                </a:ext>
+              </a:extLst>
+            </p:cNvPr>
+            <p:cNvSpPr/>
+            <p:nvPr/>
+          </p:nvSpPr>
+          <p:spPr>
+            <a:xfrm>
+              <a:off x="846025" y="3860196"/>
+              <a:ext cx="1140432" cy="606175"/>
+            </a:xfrm>
+            <a:prstGeom prst="rect">
+              <a:avLst/>
+            </a:prstGeom>
+            <a:noFill/>
+            <a:ln w="38100"/>
+          </p:spPr>
+          <p:style>
+            <a:lnRef idx="2">
+              <a:schemeClr val="accent1">
+                <a:shade val="15000"/>
+              </a:schemeClr>
+            </a:lnRef>
+            <a:fillRef idx="1">
+              <a:schemeClr val="accent1"/>
+            </a:fillRef>
+            <a:effectRef idx="0">
+              <a:schemeClr val="accent1"/>
+            </a:effectRef>
+            <a:fontRef idx="minor">
+              <a:schemeClr val="lt1"/>
+            </a:fontRef>
+          </p:style>
+          <p:txBody>
+            <a:bodyPr rtlCol="0" anchor="ctr"/>
+            <a:lstStyle/>
+            <a:p>
+              <a:pPr algn="ctr"/>
+              <a:endParaRPr lang="en-GB"/>
+            </a:p>
+          </p:txBody>
+        </p:sp>
+        <p:cxnSp>
+          <p:nvCxnSpPr>
+            <p:cNvPr id="17" name="Straight Connector 16">
+              <a:extLst>
+                <a:ext uri="{FF2B5EF4-FFF2-40B4-BE49-F238E27FC236}">
+                  <a16:creationId xmlns:a16="http://schemas.microsoft.com/office/drawing/2014/main" id="{EC7EF1F0-E5EF-183B-9C93-CF6C53E15E0F}"/>
+                </a:ext>
+              </a:extLst>
+            </p:cNvPr>
+            <p:cNvCxnSpPr/>
+            <p:nvPr/>
+          </p:nvCxnSpPr>
+          <p:spPr>
+            <a:xfrm flipV="1">
+              <a:off x="1986457" y="1690688"/>
+              <a:ext cx="2722779" cy="2169508"/>
+            </a:xfrm>
+            <a:prstGeom prst="line">
+              <a:avLst/>
+            </a:prstGeom>
+          </p:spPr>
+          <p:style>
+            <a:lnRef idx="1">
+              <a:schemeClr val="accent1"/>
+            </a:lnRef>
+            <a:fillRef idx="0">
+              <a:schemeClr val="accent1"/>
+            </a:fillRef>
+            <a:effectRef idx="0">
+              <a:schemeClr val="accent1"/>
+            </a:effectRef>
+            <a:fontRef idx="minor">
+              <a:schemeClr val="tx1"/>
+            </a:fontRef>
+          </p:style>
+        </p:cxnSp>
+        <p:cxnSp>
+          <p:nvCxnSpPr>
+            <p:cNvPr id="19" name="Straight Connector 18">
+              <a:extLst>
+                <a:ext uri="{FF2B5EF4-FFF2-40B4-BE49-F238E27FC236}">
+                  <a16:creationId xmlns:a16="http://schemas.microsoft.com/office/drawing/2014/main" id="{538346DE-2EFB-9967-D281-43A3A577108A}"/>
+                </a:ext>
+              </a:extLst>
+            </p:cNvPr>
+            <p:cNvCxnSpPr/>
+            <p:nvPr/>
+          </p:nvCxnSpPr>
+          <p:spPr>
+            <a:xfrm>
+              <a:off x="1986457" y="4466371"/>
+              <a:ext cx="2722779" cy="214522"/>
+            </a:xfrm>
+            <a:prstGeom prst="line">
+              <a:avLst/>
+            </a:prstGeom>
+          </p:spPr>
+          <p:style>
+            <a:lnRef idx="1">
+              <a:schemeClr val="accent1"/>
+            </a:lnRef>
+            <a:fillRef idx="0">
+              <a:schemeClr val="accent1"/>
+            </a:fillRef>
+            <a:effectRef idx="0">
+              <a:schemeClr val="accent1"/>
+            </a:effectRef>
+            <a:fontRef idx="minor">
+              <a:schemeClr val="tx1"/>
+            </a:fontRef>
+          </p:style>
+        </p:cxnSp>
+      </p:grpSp>
     </p:spTree>
     <p:extLst>
       <p:ext uri="{BB962C8B-B14F-4D97-AF65-F5344CB8AC3E}">
@@ -3529,7 +3859,7 @@
           <p:cNvPr id="2" name="Title 1">
             <a:extLst>
               <a:ext uri="{FF2B5EF4-FFF2-40B4-BE49-F238E27FC236}">
-                <a16:creationId xmlns:a16="http://schemas.microsoft.com/office/drawing/2014/main" id="{58FEAA12-EF04-9ABF-EF04-D4EAB92AC0AC}"/>
+                <a16:creationId xmlns:a16="http://schemas.microsoft.com/office/drawing/2014/main" id="{3CA32DF4-7E6D-5A10-9FE7-014C6D3EF11A}"/>
               </a:ext>
             </a:extLst>
           </p:cNvPr>
@@ -3546,9 +3876,10 @@
           <a:lstStyle/>
           <a:p>
             <a:r>
-              <a:rPr lang="en-GB" dirty="0"/>
-              <a:t>CV selection</a:t>
-            </a:r>
+              <a:rPr lang="en-US" dirty="0"/>
+              <a:t>Analytical pipeline overview</a:t>
+            </a:r>
+            <a:endParaRPr lang="en-GB" dirty="0"/>
           </a:p>
         </p:txBody>
       </p:sp>
@@ -3557,7 +3888,7 @@
           <p:cNvPr id="3" name="Content Placeholder 2">
             <a:extLst>
               <a:ext uri="{FF2B5EF4-FFF2-40B4-BE49-F238E27FC236}">
-                <a16:creationId xmlns:a16="http://schemas.microsoft.com/office/drawing/2014/main" id="{5BEA7F2F-6527-2BF9-BD7C-1D78351965CA}"/>
+                <a16:creationId xmlns:a16="http://schemas.microsoft.com/office/drawing/2014/main" id="{678B2ED1-6252-F90F-34C2-920F38F9EA8F}"/>
               </a:ext>
             </a:extLst>
           </p:cNvPr>
@@ -3573,14 +3904,104 @@
           <a:bodyPr/>
           <a:lstStyle/>
           <a:p>
-            <a:endParaRPr lang="en-GB"/>
+            <a:r>
+              <a:rPr lang="en-US" dirty="0"/>
+              <a:t>Input: [</a:t>
+            </a:r>
+            <a:r>
+              <a:rPr lang="en-US" dirty="0" err="1"/>
+              <a:t>pro_a</a:t>
+            </a:r>
+            <a:r>
+              <a:rPr lang="en-US" dirty="0"/>
+              <a:t>, </a:t>
+            </a:r>
+            <a:r>
+              <a:rPr lang="en-US" dirty="0" err="1"/>
+              <a:t>pro_b</a:t>
+            </a:r>
+            <a:r>
+              <a:rPr lang="en-US" dirty="0"/>
+              <a:t>, </a:t>
+            </a:r>
+            <a:r>
+              <a:rPr lang="en-US" dirty="0" err="1"/>
+              <a:t>pro_c</a:t>
+            </a:r>
+            <a:r>
+              <a:rPr lang="en-US" dirty="0"/>
+              <a:t>]</a:t>
+            </a:r>
+          </a:p>
+          <a:p>
+            <a:r>
+              <a:rPr lang="en-US" dirty="0"/>
+              <a:t>Output: </a:t>
+            </a:r>
+          </a:p>
+          <a:p>
+            <a:pPr lvl="1"/>
+            <a:r>
+              <a:rPr lang="en-US" dirty="0"/>
+              <a:t>Binding free energy on pair A-B, A-C; </a:t>
+            </a:r>
+          </a:p>
+          <a:p>
+            <a:pPr lvl="1"/>
+            <a:r>
+              <a:rPr lang="en-US" dirty="0"/>
+              <a:t>FEP on selected CV space.</a:t>
+            </a:r>
+          </a:p>
+          <a:p>
+            <a:pPr lvl="1"/>
+            <a:endParaRPr lang="en-US" dirty="0"/>
+          </a:p>
+          <a:p>
+            <a:r>
+              <a:rPr lang="en-US" dirty="0"/>
+              <a:t>Dependency:</a:t>
+            </a:r>
+          </a:p>
+          <a:p>
+            <a:pPr lvl="1"/>
+            <a:r>
+              <a:rPr lang="en-US" dirty="0"/>
+              <a:t>Python with </a:t>
+            </a:r>
+            <a:r>
+              <a:rPr lang="en-US" dirty="0" err="1"/>
+              <a:t>conda</a:t>
+            </a:r>
+            <a:r>
+              <a:rPr lang="en-US" dirty="0"/>
+              <a:t> </a:t>
+            </a:r>
+          </a:p>
+          <a:p>
+            <a:pPr lvl="1"/>
+            <a:r>
+              <a:rPr lang="en-US" dirty="0" err="1"/>
+              <a:t>Gromacs</a:t>
+            </a:r>
+            <a:r>
+              <a:rPr lang="en-US" dirty="0"/>
+              <a:t>/AMBER/OpenMM as MD engine</a:t>
+            </a:r>
+          </a:p>
+          <a:p>
+            <a:pPr lvl="1"/>
+            <a:r>
+              <a:rPr lang="en-US" dirty="0"/>
+              <a:t>Shell (for cluster submission)</a:t>
+            </a:r>
           </a:p>
         </p:txBody>
       </p:sp>
     </p:spTree>
     <p:extLst>
       <p:ext uri="{BB962C8B-B14F-4D97-AF65-F5344CB8AC3E}">
-        <p14:creationId xmlns:p14="http://schemas.microsoft.com/office/powerpoint/2010/main" val="1033781015"/>
+        <p14:creationId xmlns:p14="http://schemas.microsoft.com/office/powerpoint/2010/main" val="147304233"/>
       </p:ext>
     </p:extLst>
   </p:cSld>
@@ -3612,6 +4033,750 @@
           <p:cNvPr id="2" name="Title 1">
             <a:extLst>
               <a:ext uri="{FF2B5EF4-FFF2-40B4-BE49-F238E27FC236}">
+                <a16:creationId xmlns:a16="http://schemas.microsoft.com/office/drawing/2014/main" id="{3CA32DF4-7E6D-5A10-9FE7-014C6D3EF11A}"/>
+              </a:ext>
+            </a:extLst>
+          </p:cNvPr>
+          <p:cNvSpPr>
+            <a:spLocks noGrp="1"/>
+          </p:cNvSpPr>
+          <p:nvPr>
+            <p:ph type="title"/>
+          </p:nvPr>
+        </p:nvSpPr>
+        <p:spPr/>
+        <p:txBody>
+          <a:bodyPr/>
+          <a:lstStyle/>
+          <a:p>
+            <a:r>
+              <a:rPr lang="en-US" dirty="0"/>
+              <a:t>Analytical pipeline</a:t>
+            </a:r>
+            <a:endParaRPr lang="en-GB" dirty="0"/>
+          </a:p>
+        </p:txBody>
+      </p:sp>
+      <p:sp>
+        <p:nvSpPr>
+          <p:cNvPr id="3" name="Content Placeholder 2">
+            <a:extLst>
+              <a:ext uri="{FF2B5EF4-FFF2-40B4-BE49-F238E27FC236}">
+                <a16:creationId xmlns:a16="http://schemas.microsoft.com/office/drawing/2014/main" id="{678B2ED1-6252-F90F-34C2-920F38F9EA8F}"/>
+              </a:ext>
+            </a:extLst>
+          </p:cNvPr>
+          <p:cNvSpPr>
+            <a:spLocks noGrp="1"/>
+          </p:cNvSpPr>
+          <p:nvPr>
+            <p:ph idx="1"/>
+          </p:nvPr>
+        </p:nvSpPr>
+        <p:spPr/>
+        <p:txBody>
+          <a:bodyPr>
+            <a:normAutofit lnSpcReduction="10000"/>
+          </a:bodyPr>
+          <a:lstStyle/>
+          <a:p>
+            <a:r>
+              <a:rPr lang="en-US" dirty="0"/>
+              <a:t>Phase 1: Preparation of structure</a:t>
+            </a:r>
+          </a:p>
+          <a:p>
+            <a:pPr lvl="1"/>
+            <a:r>
+              <a:rPr lang="en-US" dirty="0"/>
+              <a:t>Search for binding pattern (skipped since we have structures)</a:t>
+            </a:r>
+          </a:p>
+          <a:p>
+            <a:pPr lvl="1"/>
+            <a:r>
+              <a:rPr lang="en-US" dirty="0"/>
+              <a:t>Water/Ion/Protonation state</a:t>
+            </a:r>
+          </a:p>
+          <a:p>
+            <a:pPr lvl="1"/>
+            <a:r>
+              <a:rPr lang="en-US" dirty="0"/>
+              <a:t>Generation of classic MD run files (GROMACS)</a:t>
+            </a:r>
+          </a:p>
+          <a:p>
+            <a:pPr lvl="1"/>
+            <a:r>
+              <a:rPr lang="en-US" dirty="0"/>
+              <a:t>Generation of complex file for MMPBSA (</a:t>
+            </a:r>
+            <a:r>
+              <a:rPr lang="en-US" dirty="0" err="1"/>
+              <a:t>gmx_MMGBSA</a:t>
+            </a:r>
+            <a:r>
+              <a:rPr lang="en-US" dirty="0"/>
+              <a:t> in </a:t>
+            </a:r>
+            <a:r>
+              <a:rPr lang="en-US" dirty="0" err="1"/>
+              <a:t>conda</a:t>
+            </a:r>
+            <a:r>
+              <a:rPr lang="en-US" dirty="0"/>
+              <a:t>)</a:t>
+            </a:r>
+          </a:p>
+          <a:p>
+            <a:pPr lvl="1"/>
+            <a:endParaRPr lang="en-US" dirty="0"/>
+          </a:p>
+          <a:p>
+            <a:r>
+              <a:rPr lang="en-US" dirty="0"/>
+              <a:t>Phase 2: MD simulations with post-MD analysis</a:t>
+            </a:r>
+          </a:p>
+          <a:p>
+            <a:pPr lvl="1"/>
+            <a:r>
+              <a:rPr lang="en-US" dirty="0"/>
+              <a:t>Run MD on GROMACS</a:t>
+            </a:r>
+          </a:p>
+          <a:p>
+            <a:pPr lvl="1"/>
+            <a:r>
+              <a:rPr lang="en-US" dirty="0"/>
+              <a:t>Run MMPBSA</a:t>
+            </a:r>
+          </a:p>
+          <a:p>
+            <a:pPr lvl="1"/>
+            <a:r>
+              <a:rPr lang="en-US" dirty="0"/>
+              <a:t>Analysis on per-residue decomposition</a:t>
+            </a:r>
+          </a:p>
+          <a:p>
+            <a:pPr lvl="1"/>
+            <a:r>
+              <a:rPr lang="en-US" dirty="0"/>
+              <a:t>Select a CV and run </a:t>
+            </a:r>
+            <a:r>
+              <a:rPr lang="en-US" dirty="0" err="1"/>
+              <a:t>metaD</a:t>
+            </a:r>
+            <a:r>
+              <a:rPr lang="en-US" dirty="0"/>
+              <a:t> </a:t>
+            </a:r>
+          </a:p>
+        </p:txBody>
+      </p:sp>
+    </p:spTree>
+    <p:extLst>
+      <p:ext uri="{BB962C8B-B14F-4D97-AF65-F5344CB8AC3E}">
+        <p14:creationId xmlns:p14="http://schemas.microsoft.com/office/powerpoint/2010/main" val="955991242"/>
+      </p:ext>
+    </p:extLst>
+  </p:cSld>
+  <p:clrMapOvr>
+    <a:masterClrMapping/>
+  </p:clrMapOvr>
+</p:sld>
+</file>
+
+<file path=ppt/slides/slide5.xml><?xml version="1.0" encoding="utf-8"?>
+<p:sld xmlns:a="http://schemas.openxmlformats.org/drawingml/2006/main" xmlns:r="http://schemas.openxmlformats.org/officeDocument/2006/relationships" xmlns:p="http://schemas.openxmlformats.org/presentationml/2006/main">
+  <p:cSld>
+    <p:spTree>
+      <p:nvGrpSpPr>
+        <p:cNvPr id="1" name=""/>
+        <p:cNvGrpSpPr/>
+        <p:nvPr/>
+      </p:nvGrpSpPr>
+      <p:grpSpPr>
+        <a:xfrm>
+          <a:off x="0" y="0"/>
+          <a:ext cx="0" cy="0"/>
+          <a:chOff x="0" y="0"/>
+          <a:chExt cx="0" cy="0"/>
+        </a:xfrm>
+      </p:grpSpPr>
+      <p:sp>
+        <p:nvSpPr>
+          <p:cNvPr id="2" name="Title 1">
+            <a:extLst>
+              <a:ext uri="{FF2B5EF4-FFF2-40B4-BE49-F238E27FC236}">
+                <a16:creationId xmlns:a16="http://schemas.microsoft.com/office/drawing/2014/main" id="{58FEAA12-EF04-9ABF-EF04-D4EAB92AC0AC}"/>
+              </a:ext>
+            </a:extLst>
+          </p:cNvPr>
+          <p:cNvSpPr>
+            <a:spLocks noGrp="1"/>
+          </p:cNvSpPr>
+          <p:nvPr>
+            <p:ph type="title"/>
+          </p:nvPr>
+        </p:nvSpPr>
+        <p:spPr/>
+        <p:txBody>
+          <a:bodyPr/>
+          <a:lstStyle/>
+          <a:p>
+            <a:r>
+              <a:rPr lang="en-GB" dirty="0"/>
+              <a:t>CV selection</a:t>
+            </a:r>
+          </a:p>
+        </p:txBody>
+      </p:sp>
+      <mc:AlternateContent xmlns:mc="http://schemas.openxmlformats.org/markup-compatibility/2006">
+        <mc:Choice xmlns:a14="http://schemas.microsoft.com/office/drawing/2010/main" Requires="a14">
+          <p:sp>
+            <p:nvSpPr>
+              <p:cNvPr id="3" name="Content Placeholder 2">
+                <a:extLst>
+                  <a:ext uri="{FF2B5EF4-FFF2-40B4-BE49-F238E27FC236}">
+                    <a16:creationId xmlns:a16="http://schemas.microsoft.com/office/drawing/2014/main" id="{5BEA7F2F-6527-2BF9-BD7C-1D78351965CA}"/>
+                  </a:ext>
+                </a:extLst>
+              </p:cNvPr>
+              <p:cNvSpPr>
+                <a:spLocks noGrp="1"/>
+              </p:cNvSpPr>
+              <p:nvPr>
+                <p:ph idx="1"/>
+              </p:nvPr>
+            </p:nvSpPr>
+            <p:spPr>
+              <a:xfrm>
+                <a:off x="838200" y="1690688"/>
+                <a:ext cx="4264720" cy="4351338"/>
+              </a:xfrm>
+            </p:spPr>
+            <p:txBody>
+              <a:bodyPr>
+                <a:normAutofit fontScale="85000" lnSpcReduction="20000"/>
+              </a:bodyPr>
+              <a:lstStyle/>
+              <a:p>
+                <a:r>
+                  <a:rPr lang="en-US" dirty="0"/>
+                  <a:t>Key binding res on </a:t>
+                </a:r>
+                <a:r>
+                  <a:rPr lang="en-US" dirty="0" err="1"/>
+                  <a:t>pro_a</a:t>
+                </a:r>
+                <a:r>
+                  <a:rPr lang="en-US" dirty="0"/>
+                  <a:t> to </a:t>
+                </a:r>
+                <a:r>
+                  <a:rPr lang="en-US" dirty="0" err="1"/>
+                  <a:t>pro_c</a:t>
+                </a:r>
+                <a:r>
+                  <a:rPr lang="en-US" dirty="0"/>
+                  <a:t>: </a:t>
+                </a:r>
+              </a:p>
+              <a:p>
+                <a:pPr lvl="1"/>
+                <a:r>
+                  <a:rPr lang="en-US" dirty="0"/>
+                  <a:t>[417, 446, 449, 453, 455, 456, 475, 486, </a:t>
+                </a:r>
+                <a:r>
+                  <a:rPr lang="en-US" dirty="0">
+                    <a:solidFill>
+                      <a:srgbClr val="FF0000"/>
+                    </a:solidFill>
+                  </a:rPr>
+                  <a:t>487</a:t>
+                </a:r>
+                <a:r>
+                  <a:rPr lang="en-US" dirty="0"/>
+                  <a:t>, 489, 493, 496, 498, 500, 501, 502, 505]</a:t>
+                </a:r>
+              </a:p>
+              <a:p>
+                <a:endParaRPr lang="en-GB" dirty="0"/>
+              </a:p>
+              <a:p>
+                <a:r>
+                  <a:rPr lang="en-GB" dirty="0"/>
+                  <a:t>Key binding res on </a:t>
+                </a:r>
+                <a:r>
+                  <a:rPr lang="en-GB" dirty="0" err="1"/>
+                  <a:t>pro_a</a:t>
+                </a:r>
+                <a:r>
+                  <a:rPr lang="en-GB" dirty="0"/>
+                  <a:t> to </a:t>
+                </a:r>
+                <a:r>
+                  <a:rPr lang="en-GB" dirty="0" err="1"/>
+                  <a:t>pro_b</a:t>
+                </a:r>
+                <a:r>
+                  <a:rPr lang="en-GB" dirty="0"/>
+                  <a:t>:</a:t>
+                </a:r>
+              </a:p>
+              <a:p>
+                <a:pPr lvl="1"/>
+                <a:r>
+                  <a:rPr lang="en-GB" dirty="0"/>
+                  <a:t>[484, 478, 486, </a:t>
+                </a:r>
+                <a:r>
+                  <a:rPr lang="en-GB" dirty="0">
+                    <a:solidFill>
+                      <a:srgbClr val="FF0000"/>
+                    </a:solidFill>
+                  </a:rPr>
+                  <a:t>487</a:t>
+                </a:r>
+                <a:r>
+                  <a:rPr lang="en-GB" dirty="0"/>
+                  <a:t>]</a:t>
+                </a:r>
+              </a:p>
+              <a:p>
+                <a:pPr lvl="1"/>
+                <a:endParaRPr lang="en-GB" dirty="0"/>
+              </a:p>
+              <a:p>
+                <a:r>
+                  <a:rPr lang="en-GB" dirty="0"/>
+                  <a:t>Thus in this case we will use distance of N487 to its </a:t>
+                </a:r>
+                <a:r>
+                  <a:rPr lang="en-GB" dirty="0" err="1"/>
+                  <a:t>binded</a:t>
+                </a:r>
+                <a:r>
+                  <a:rPr lang="en-GB" dirty="0"/>
+                  <a:t> res as our CV. </a:t>
+                </a:r>
+              </a:p>
+              <a:p>
+                <a:pPr lvl="1"/>
+                <a14:m>
+                  <m:oMath xmlns:m="http://schemas.openxmlformats.org/officeDocument/2006/math">
+                    <m:r>
+                      <a:rPr lang="en-GB" i="1" smtClean="0">
+                        <a:latin typeface="Cambria Math" panose="02040503050406030204" pitchFamily="18" charset="0"/>
+                      </a:rPr>
+                      <m:t>𝜉</m:t>
+                    </m:r>
+                    <m:r>
+                      <a:rPr lang="en-GB" i="1" smtClean="0">
+                        <a:latin typeface="Cambria Math" panose="02040503050406030204" pitchFamily="18" charset="0"/>
+                      </a:rPr>
+                      <m:t>=</m:t>
+                    </m:r>
+                    <m:acc>
+                      <m:accPr>
+                        <m:chr m:val="⃗"/>
+                        <m:ctrlPr>
+                          <a:rPr lang="en-GB" i="1" smtClean="0">
+                            <a:solidFill>
+                              <a:srgbClr val="836967"/>
+                            </a:solidFill>
+                            <a:latin typeface="Cambria Math" panose="02040503050406030204" pitchFamily="18" charset="0"/>
+                          </a:rPr>
+                        </m:ctrlPr>
+                      </m:accPr>
+                      <m:e>
+                        <m:r>
+                          <a:rPr lang="en-GB" i="1" smtClean="0">
+                            <a:latin typeface="Cambria Math" panose="02040503050406030204" pitchFamily="18" charset="0"/>
+                          </a:rPr>
+                          <m:t>𝑟</m:t>
+                        </m:r>
+                      </m:e>
+                    </m:acc>
+                    <m:r>
+                      <a:rPr lang="en-US" b="0" i="1" smtClean="0">
+                        <a:latin typeface="Cambria Math" panose="02040503050406030204" pitchFamily="18" charset="0"/>
+                      </a:rPr>
+                      <m:t>(</m:t>
+                    </m:r>
+                    <m:r>
+                      <a:rPr lang="en-US" b="0" i="1" smtClean="0">
+                        <a:latin typeface="Cambria Math" panose="02040503050406030204" pitchFamily="18" charset="0"/>
+                      </a:rPr>
+                      <m:t>𝑁</m:t>
+                    </m:r>
+                    <m:r>
+                      <a:rPr lang="en-US" b="0" i="1" smtClean="0">
+                        <a:latin typeface="Cambria Math" panose="02040503050406030204" pitchFamily="18" charset="0"/>
+                      </a:rPr>
+                      <m:t>487, </m:t>
+                    </m:r>
+                    <m:r>
+                      <a:rPr lang="en-US" b="0" i="1" smtClean="0">
+                        <a:latin typeface="Cambria Math" panose="02040503050406030204" pitchFamily="18" charset="0"/>
+                      </a:rPr>
+                      <m:t>𝑅𝑒𝑠</m:t>
+                    </m:r>
+                    <m:r>
+                      <a:rPr lang="en-US" b="0" i="1" smtClean="0">
+                        <a:latin typeface="Cambria Math" panose="02040503050406030204" pitchFamily="18" charset="0"/>
+                      </a:rPr>
+                      <m:t>)</m:t>
+                    </m:r>
+                  </m:oMath>
+                </a14:m>
+                <a:r>
+                  <a:rPr lang="en-GB" dirty="0"/>
+                  <a:t> </a:t>
+                </a:r>
+              </a:p>
+              <a:p>
+                <a:pPr lvl="1"/>
+                <a:endParaRPr lang="en-GB" dirty="0"/>
+              </a:p>
+            </p:txBody>
+          </p:sp>
+        </mc:Choice>
+        <mc:Fallback>
+          <p:sp>
+            <p:nvSpPr>
+              <p:cNvPr id="3" name="Content Placeholder 2">
+                <a:extLst>
+                  <a:ext uri="{FF2B5EF4-FFF2-40B4-BE49-F238E27FC236}">
+                    <a16:creationId xmlns:a16="http://schemas.microsoft.com/office/drawing/2014/main" id="{5BEA7F2F-6527-2BF9-BD7C-1D78351965CA}"/>
+                  </a:ext>
+                </a:extLst>
+              </p:cNvPr>
+              <p:cNvSpPr>
+                <a:spLocks noGrp="1" noRot="1" noChangeAspect="1" noMove="1" noResize="1" noEditPoints="1" noAdjustHandles="1" noChangeArrowheads="1" noChangeShapeType="1" noTextEdit="1"/>
+              </p:cNvSpPr>
+              <p:nvPr>
+                <p:ph idx="1"/>
+              </p:nvPr>
+            </p:nvSpPr>
+            <p:spPr>
+              <a:xfrm>
+                <a:off x="838200" y="1690688"/>
+                <a:ext cx="4264720" cy="4351338"/>
+              </a:xfrm>
+              <a:blipFill>
+                <a:blip r:embed="rId2"/>
+                <a:stretch>
+                  <a:fillRect l="-2003" t="-3221"/>
+                </a:stretch>
+              </a:blipFill>
+            </p:spPr>
+            <p:txBody>
+              <a:bodyPr/>
+              <a:lstStyle/>
+              <a:p>
+                <a:r>
+                  <a:rPr lang="en-GB">
+                    <a:noFill/>
+                  </a:rPr>
+                  <a:t> </a:t>
+                </a:r>
+              </a:p>
+            </p:txBody>
+          </p:sp>
+        </mc:Fallback>
+      </mc:AlternateContent>
+      <p:sp>
+        <p:nvSpPr>
+          <p:cNvPr id="11" name="TextBox 10">
+            <a:extLst>
+              <a:ext uri="{FF2B5EF4-FFF2-40B4-BE49-F238E27FC236}">
+                <a16:creationId xmlns:a16="http://schemas.microsoft.com/office/drawing/2014/main" id="{3EAFFCA0-4123-E351-43C3-651E7A54F6F4}"/>
+              </a:ext>
+            </a:extLst>
+          </p:cNvPr>
+          <p:cNvSpPr txBox="1"/>
+          <p:nvPr/>
+        </p:nvSpPr>
+        <p:spPr>
+          <a:xfrm>
+            <a:off x="6672649" y="6290359"/>
+            <a:ext cx="6091880" cy="369332"/>
+          </a:xfrm>
+          <a:prstGeom prst="rect">
+            <a:avLst/>
+          </a:prstGeom>
+          <a:noFill/>
+        </p:spPr>
+        <p:txBody>
+          <a:bodyPr wrap="square">
+            <a:spAutoFit/>
+          </a:bodyPr>
+          <a:lstStyle/>
+          <a:p>
+            <a:r>
+              <a:rPr lang="en-GB" dirty="0"/>
+              <a:t>https://www.nature.com/articles/s41586-020-2180-5</a:t>
+            </a:r>
+          </a:p>
+        </p:txBody>
+      </p:sp>
+      <p:grpSp>
+        <p:nvGrpSpPr>
+          <p:cNvPr id="17" name="Group 16">
+            <a:extLst>
+              <a:ext uri="{FF2B5EF4-FFF2-40B4-BE49-F238E27FC236}">
+                <a16:creationId xmlns:a16="http://schemas.microsoft.com/office/drawing/2014/main" id="{236CF905-57CF-DE95-6EA3-0F8FCB43582B}"/>
+              </a:ext>
+            </a:extLst>
+          </p:cNvPr>
+          <p:cNvGrpSpPr/>
+          <p:nvPr/>
+        </p:nvGrpSpPr>
+        <p:grpSpPr>
+          <a:xfrm>
+            <a:off x="5102920" y="1124699"/>
+            <a:ext cx="6698201" cy="4608602"/>
+            <a:chOff x="6437450" y="878745"/>
+            <a:chExt cx="6698201" cy="4608602"/>
+          </a:xfrm>
+        </p:grpSpPr>
+        <p:grpSp>
+          <p:nvGrpSpPr>
+            <p:cNvPr id="12" name="Group 11">
+              <a:extLst>
+                <a:ext uri="{FF2B5EF4-FFF2-40B4-BE49-F238E27FC236}">
+                  <a16:creationId xmlns:a16="http://schemas.microsoft.com/office/drawing/2014/main" id="{B203572F-7DBF-D986-EACF-D3B2090BF73A}"/>
+                </a:ext>
+              </a:extLst>
+            </p:cNvPr>
+            <p:cNvGrpSpPr/>
+            <p:nvPr/>
+          </p:nvGrpSpPr>
+          <p:grpSpPr>
+            <a:xfrm>
+              <a:off x="6437450" y="878745"/>
+              <a:ext cx="3349102" cy="4292612"/>
+              <a:chOff x="6437450" y="878745"/>
+              <a:chExt cx="3349102" cy="4292612"/>
+            </a:xfrm>
+          </p:grpSpPr>
+          <p:pic>
+            <p:nvPicPr>
+              <p:cNvPr id="7" name="Picture 6">
+                <a:extLst>
+                  <a:ext uri="{FF2B5EF4-FFF2-40B4-BE49-F238E27FC236}">
+                    <a16:creationId xmlns:a16="http://schemas.microsoft.com/office/drawing/2014/main" id="{51912F42-4DD1-2A02-9F04-BF729D2A6E1D}"/>
+                  </a:ext>
+                </a:extLst>
+              </p:cNvPr>
+              <p:cNvPicPr>
+                <a:picLocks noChangeAspect="1"/>
+              </p:cNvPicPr>
+              <p:nvPr/>
+            </p:nvPicPr>
+            <p:blipFill>
+              <a:blip r:embed="rId3">
+                <a:extLst>
+                  <a:ext uri="{28A0092B-C50C-407E-A947-70E740481C1C}">
+                    <a14:useLocalDpi xmlns:a14="http://schemas.microsoft.com/office/drawing/2010/main" val="0"/>
+                  </a:ext>
+                </a:extLst>
+              </a:blip>
+              <a:stretch>
+                <a:fillRect/>
+              </a:stretch>
+            </p:blipFill>
+            <p:spPr>
+              <a:xfrm>
+                <a:off x="6437450" y="878745"/>
+                <a:ext cx="3349102" cy="3131274"/>
+              </a:xfrm>
+              <a:prstGeom prst="rect">
+                <a:avLst/>
+              </a:prstGeom>
+            </p:spPr>
+          </p:pic>
+          <p:sp>
+            <p:nvSpPr>
+              <p:cNvPr id="9" name="TextBox 8">
+                <a:extLst>
+                  <a:ext uri="{FF2B5EF4-FFF2-40B4-BE49-F238E27FC236}">
+                    <a16:creationId xmlns:a16="http://schemas.microsoft.com/office/drawing/2014/main" id="{CF5BC3A4-654F-B5C4-AA44-5EF9AC0FC469}"/>
+                  </a:ext>
+                </a:extLst>
+              </p:cNvPr>
+              <p:cNvSpPr txBox="1"/>
+              <p:nvPr/>
+            </p:nvSpPr>
+            <p:spPr>
+              <a:xfrm>
+                <a:off x="6437450" y="3971028"/>
+                <a:ext cx="3349101" cy="1200329"/>
+              </a:xfrm>
+              <a:prstGeom prst="rect">
+                <a:avLst/>
+              </a:prstGeom>
+              <a:noFill/>
+            </p:spPr>
+            <p:txBody>
+              <a:bodyPr wrap="square">
+                <a:spAutoFit/>
+              </a:bodyPr>
+              <a:lstStyle/>
+              <a:p>
+                <a:r>
+                  <a:rPr lang="en-US" dirty="0"/>
+                  <a:t>Binding of S1 spike protein(blue) with ACE2(grey).</a:t>
+                </a:r>
+                <a:r>
+                  <a:rPr lang="en-GB" dirty="0"/>
+                  <a:t> contacting residue on S1 protein are shown in blue surface.</a:t>
+                </a:r>
+                <a:endParaRPr lang="en-US" dirty="0"/>
+              </a:p>
+            </p:txBody>
+          </p:sp>
+        </p:grpSp>
+        <p:grpSp>
+          <p:nvGrpSpPr>
+            <p:cNvPr id="16" name="Group 15">
+              <a:extLst>
+                <a:ext uri="{FF2B5EF4-FFF2-40B4-BE49-F238E27FC236}">
+                  <a16:creationId xmlns:a16="http://schemas.microsoft.com/office/drawing/2014/main" id="{96AB60CC-5B67-ABCC-1B4B-DDFA730BD325}"/>
+                </a:ext>
+              </a:extLst>
+            </p:cNvPr>
+            <p:cNvGrpSpPr/>
+            <p:nvPr/>
+          </p:nvGrpSpPr>
+          <p:grpSpPr>
+            <a:xfrm>
+              <a:off x="9786550" y="878745"/>
+              <a:ext cx="3349101" cy="4608602"/>
+              <a:chOff x="9786550" y="878745"/>
+              <a:chExt cx="3349101" cy="4608602"/>
+            </a:xfrm>
+          </p:grpSpPr>
+          <p:pic>
+            <p:nvPicPr>
+              <p:cNvPr id="14" name="Picture 13">
+                <a:extLst>
+                  <a:ext uri="{FF2B5EF4-FFF2-40B4-BE49-F238E27FC236}">
+                    <a16:creationId xmlns:a16="http://schemas.microsoft.com/office/drawing/2014/main" id="{B59C6E01-5A8E-2A75-3188-DD60E664AC81}"/>
+                  </a:ext>
+                </a:extLst>
+              </p:cNvPr>
+              <p:cNvPicPr>
+                <a:picLocks noChangeAspect="1"/>
+              </p:cNvPicPr>
+              <p:nvPr/>
+            </p:nvPicPr>
+            <p:blipFill>
+              <a:blip r:embed="rId4">
+                <a:extLst>
+                  <a:ext uri="{28A0092B-C50C-407E-A947-70E740481C1C}">
+                    <a14:useLocalDpi xmlns:a14="http://schemas.microsoft.com/office/drawing/2010/main" val="0"/>
+                  </a:ext>
+                </a:extLst>
+              </a:blip>
+              <a:stretch>
+                <a:fillRect/>
+              </a:stretch>
+            </p:blipFill>
+            <p:spPr>
+              <a:xfrm>
+                <a:off x="9786550" y="878745"/>
+                <a:ext cx="3349101" cy="3131274"/>
+              </a:xfrm>
+              <a:prstGeom prst="rect">
+                <a:avLst/>
+              </a:prstGeom>
+            </p:spPr>
+          </p:pic>
+          <p:sp>
+            <p:nvSpPr>
+              <p:cNvPr id="15" name="TextBox 14">
+                <a:extLst>
+                  <a:ext uri="{FF2B5EF4-FFF2-40B4-BE49-F238E27FC236}">
+                    <a16:creationId xmlns:a16="http://schemas.microsoft.com/office/drawing/2014/main" id="{D70DA1D7-F848-EF20-D3AD-D076387B329A}"/>
+                  </a:ext>
+                </a:extLst>
+              </p:cNvPr>
+              <p:cNvSpPr txBox="1"/>
+              <p:nvPr/>
+            </p:nvSpPr>
+            <p:spPr>
+              <a:xfrm>
+                <a:off x="9786550" y="4010019"/>
+                <a:ext cx="3349101" cy="1477328"/>
+              </a:xfrm>
+              <a:prstGeom prst="rect">
+                <a:avLst/>
+              </a:prstGeom>
+              <a:noFill/>
+            </p:spPr>
+            <p:txBody>
+              <a:bodyPr wrap="square">
+                <a:spAutoFit/>
+              </a:bodyPr>
+              <a:lstStyle/>
+              <a:p>
+                <a:r>
+                  <a:rPr lang="en-US" dirty="0"/>
+                  <a:t>Binding of S1 spike protein(blue) with antibody THSC20.HVTR26 (red).</a:t>
+                </a:r>
+                <a:r>
+                  <a:rPr lang="en-GB" dirty="0"/>
+                  <a:t> contacting residue on S1 protein are shown in blue surface.</a:t>
+                </a:r>
+                <a:endParaRPr lang="en-US" dirty="0"/>
+              </a:p>
+            </p:txBody>
+          </p:sp>
+        </p:grpSp>
+      </p:grpSp>
+    </p:spTree>
+    <p:extLst>
+      <p:ext uri="{BB962C8B-B14F-4D97-AF65-F5344CB8AC3E}">
+        <p14:creationId xmlns:p14="http://schemas.microsoft.com/office/powerpoint/2010/main" val="1033781015"/>
+      </p:ext>
+    </p:extLst>
+  </p:cSld>
+  <p:clrMapOvr>
+    <a:masterClrMapping/>
+  </p:clrMapOvr>
+</p:sld>
+</file>
+
+<file path=ppt/slides/slide6.xml><?xml version="1.0" encoding="utf-8"?>
+<p:sld xmlns:a="http://schemas.openxmlformats.org/drawingml/2006/main" xmlns:r="http://schemas.openxmlformats.org/officeDocument/2006/relationships" xmlns:p="http://schemas.openxmlformats.org/presentationml/2006/main">
+  <p:cSld>
+    <p:spTree>
+      <p:nvGrpSpPr>
+        <p:cNvPr id="1" name=""/>
+        <p:cNvGrpSpPr/>
+        <p:nvPr/>
+      </p:nvGrpSpPr>
+      <p:grpSpPr>
+        <a:xfrm>
+          <a:off x="0" y="0"/>
+          <a:ext cx="0" cy="0"/>
+          <a:chOff x="0" y="0"/>
+          <a:chExt cx="0" cy="0"/>
+        </a:xfrm>
+      </p:grpSpPr>
+      <p:sp>
+        <p:nvSpPr>
+          <p:cNvPr id="2" name="Title 1">
+            <a:extLst>
+              <a:ext uri="{FF2B5EF4-FFF2-40B4-BE49-F238E27FC236}">
                 <a16:creationId xmlns:a16="http://schemas.microsoft.com/office/drawing/2014/main" id="{9A7D685A-9AD2-71F0-28AF-435A3A6F35E3}"/>
               </a:ext>
             </a:extLst>
@@ -3625,12 +4790,22 @@
         </p:nvSpPr>
         <p:spPr/>
         <p:txBody>
-          <a:bodyPr/>
-          <a:lstStyle/>
-          <a:p>
-            <a:r>
-              <a:rPr lang="en-GB" dirty="0"/>
-              <a:t>Energetic metrics</a:t>
+          <a:bodyPr>
+            <a:normAutofit/>
+          </a:bodyPr>
+          <a:lstStyle/>
+          <a:p>
+            <a:r>
+              <a:rPr lang="en-US" sz="3200" dirty="0"/>
+              <a:t>M</a:t>
+            </a:r>
+            <a:r>
+              <a:rPr lang="en-GB" sz="3200" dirty="0" err="1"/>
+              <a:t>etaDynamics</a:t>
+            </a:r>
+            <a:r>
+              <a:rPr lang="en-GB" sz="3200" dirty="0"/>
+              <a:t> and other Enhanced Sampling techniques</a:t>
             </a:r>
           </a:p>
         </p:txBody>
@@ -3664,6 +4839,293 @@
     <p:extLst>
       <p:ext uri="{BB962C8B-B14F-4D97-AF65-F5344CB8AC3E}">
         <p14:creationId xmlns:p14="http://schemas.microsoft.com/office/powerpoint/2010/main" val="898478908"/>
+      </p:ext>
+    </p:extLst>
+  </p:cSld>
+  <p:clrMapOvr>
+    <a:masterClrMapping/>
+  </p:clrMapOvr>
+</p:sld>
+</file>
+
+<file path=ppt/slides/slide7.xml><?xml version="1.0" encoding="utf-8"?>
+<p:sld xmlns:a="http://schemas.openxmlformats.org/drawingml/2006/main" xmlns:r="http://schemas.openxmlformats.org/officeDocument/2006/relationships" xmlns:p="http://schemas.openxmlformats.org/presentationml/2006/main">
+  <p:cSld>
+    <p:spTree>
+      <p:nvGrpSpPr>
+        <p:cNvPr id="1" name=""/>
+        <p:cNvGrpSpPr/>
+        <p:nvPr/>
+      </p:nvGrpSpPr>
+      <p:grpSpPr>
+        <a:xfrm>
+          <a:off x="0" y="0"/>
+          <a:ext cx="0" cy="0"/>
+          <a:chOff x="0" y="0"/>
+          <a:chExt cx="0" cy="0"/>
+        </a:xfrm>
+      </p:grpSpPr>
+      <p:sp>
+        <p:nvSpPr>
+          <p:cNvPr id="2" name="Title 1">
+            <a:extLst>
+              <a:ext uri="{FF2B5EF4-FFF2-40B4-BE49-F238E27FC236}">
+                <a16:creationId xmlns:a16="http://schemas.microsoft.com/office/drawing/2014/main" id="{D38D122B-F556-35A8-399D-DE0846A08931}"/>
+              </a:ext>
+            </a:extLst>
+          </p:cNvPr>
+          <p:cNvSpPr>
+            <a:spLocks noGrp="1"/>
+          </p:cNvSpPr>
+          <p:nvPr>
+            <p:ph type="title"/>
+          </p:nvPr>
+        </p:nvSpPr>
+        <p:spPr/>
+        <p:txBody>
+          <a:bodyPr/>
+          <a:lstStyle/>
+          <a:p>
+            <a:r>
+              <a:rPr lang="en-US" dirty="0"/>
+              <a:t>A bit more on ES…</a:t>
+            </a:r>
+            <a:endParaRPr lang="en-GB" dirty="0"/>
+          </a:p>
+        </p:txBody>
+      </p:sp>
+      <p:grpSp>
+        <p:nvGrpSpPr>
+          <p:cNvPr id="4" name="Group 3">
+            <a:extLst>
+              <a:ext uri="{FF2B5EF4-FFF2-40B4-BE49-F238E27FC236}">
+                <a16:creationId xmlns:a16="http://schemas.microsoft.com/office/drawing/2014/main" id="{500AB91E-4568-3F36-BEDC-FF664443679C}"/>
+              </a:ext>
+            </a:extLst>
+          </p:cNvPr>
+          <p:cNvGrpSpPr/>
+          <p:nvPr/>
+        </p:nvGrpSpPr>
+        <p:grpSpPr>
+          <a:xfrm>
+            <a:off x="1693334" y="1775354"/>
+            <a:ext cx="8322196" cy="4431072"/>
+            <a:chOff x="-36768" y="0"/>
+            <a:chExt cx="4239198" cy="2257616"/>
+          </a:xfrm>
+        </p:grpSpPr>
+        <p:grpSp>
+          <p:nvGrpSpPr>
+            <p:cNvPr id="5" name="Group 4">
+              <a:extLst>
+                <a:ext uri="{FF2B5EF4-FFF2-40B4-BE49-F238E27FC236}">
+                  <a16:creationId xmlns:a16="http://schemas.microsoft.com/office/drawing/2014/main" id="{7B905DD4-EC57-1C8A-D8F5-7A8332464449}"/>
+                </a:ext>
+              </a:extLst>
+            </p:cNvPr>
+            <p:cNvGrpSpPr/>
+            <p:nvPr/>
+          </p:nvGrpSpPr>
+          <p:grpSpPr>
+            <a:xfrm>
+              <a:off x="0" y="0"/>
+              <a:ext cx="4202430" cy="1696085"/>
+              <a:chOff x="0" y="0"/>
+              <a:chExt cx="5016401" cy="2025521"/>
+            </a:xfrm>
+          </p:grpSpPr>
+          <p:pic>
+            <p:nvPicPr>
+              <p:cNvPr id="7" name="Picture 6">
+                <a:extLst>
+                  <a:ext uri="{FF2B5EF4-FFF2-40B4-BE49-F238E27FC236}">
+                    <a16:creationId xmlns:a16="http://schemas.microsoft.com/office/drawing/2014/main" id="{BC10A549-14EE-F006-2D8D-4A6FC574E998}"/>
+                  </a:ext>
+                </a:extLst>
+              </p:cNvPr>
+              <p:cNvPicPr>
+                <a:picLocks noChangeAspect="1"/>
+              </p:cNvPicPr>
+              <p:nvPr/>
+            </p:nvPicPr>
+            <p:blipFill>
+              <a:blip r:embed="rId2" cstate="print">
+                <a:extLst>
+                  <a:ext uri="{28A0092B-C50C-407E-A947-70E740481C1C}">
+                    <a14:useLocalDpi xmlns:a14="http://schemas.microsoft.com/office/drawing/2010/main" val="0"/>
+                  </a:ext>
+                </a:extLst>
+              </a:blip>
+              <a:srcRect/>
+              <a:stretch>
+                <a:fillRect/>
+              </a:stretch>
+            </p:blipFill>
+            <p:spPr bwMode="auto">
+              <a:xfrm>
+                <a:off x="0" y="110996"/>
+                <a:ext cx="2550160" cy="1914525"/>
+              </a:xfrm>
+              <a:prstGeom prst="rect">
+                <a:avLst/>
+              </a:prstGeom>
+              <a:noFill/>
+              <a:ln>
+                <a:noFill/>
+              </a:ln>
+            </p:spPr>
+          </p:pic>
+          <p:pic>
+            <p:nvPicPr>
+              <p:cNvPr id="8" name="Picture 7">
+                <a:extLst>
+                  <a:ext uri="{FF2B5EF4-FFF2-40B4-BE49-F238E27FC236}">
+                    <a16:creationId xmlns:a16="http://schemas.microsoft.com/office/drawing/2014/main" id="{ADE565A5-CF5E-B28F-47C8-E7B96A1D5731}"/>
+                  </a:ext>
+                </a:extLst>
+              </p:cNvPr>
+              <p:cNvPicPr>
+                <a:picLocks noChangeAspect="1"/>
+              </p:cNvPicPr>
+              <p:nvPr/>
+            </p:nvPicPr>
+            <p:blipFill>
+              <a:blip r:embed="rId3">
+                <a:extLst>
+                  <a:ext uri="{28A0092B-C50C-407E-A947-70E740481C1C}">
+                    <a14:useLocalDpi xmlns:a14="http://schemas.microsoft.com/office/drawing/2010/main" val="0"/>
+                  </a:ext>
+                </a:extLst>
+              </a:blip>
+              <a:srcRect/>
+              <a:stretch>
+                <a:fillRect/>
+              </a:stretch>
+            </p:blipFill>
+            <p:spPr bwMode="auto">
+              <a:xfrm>
+                <a:off x="2463066" y="0"/>
+                <a:ext cx="2553335" cy="1915160"/>
+              </a:xfrm>
+              <a:prstGeom prst="rect">
+                <a:avLst/>
+              </a:prstGeom>
+              <a:noFill/>
+              <a:ln>
+                <a:noFill/>
+              </a:ln>
+            </p:spPr>
+          </p:pic>
+        </p:grpSp>
+        <p:sp>
+          <p:nvSpPr>
+            <p:cNvPr id="6" name="Text Box 1">
+              <a:extLst>
+                <a:ext uri="{FF2B5EF4-FFF2-40B4-BE49-F238E27FC236}">
+                  <a16:creationId xmlns:a16="http://schemas.microsoft.com/office/drawing/2014/main" id="{4CF87EA2-8913-EC20-2B28-B7FD8935C4F5}"/>
+                </a:ext>
+              </a:extLst>
+            </p:cNvPr>
+            <p:cNvSpPr txBox="1"/>
+            <p:nvPr/>
+          </p:nvSpPr>
+          <p:spPr>
+            <a:xfrm>
+              <a:off x="-36768" y="1630372"/>
+              <a:ext cx="4127340" cy="627244"/>
+            </a:xfrm>
+            <a:prstGeom prst="rect">
+              <a:avLst/>
+            </a:prstGeom>
+            <a:solidFill>
+              <a:prstClr val="white"/>
+            </a:solidFill>
+            <a:ln>
+              <a:noFill/>
+            </a:ln>
+          </p:spPr>
+          <p:txBody>
+            <a:bodyPr rot="0" spcFirstLastPara="0" vert="horz" wrap="square" lIns="0" tIns="0" rIns="0" bIns="0" numCol="1" spcCol="0" rtlCol="0" fromWordArt="0" anchor="t" anchorCtr="0" forceAA="0" compatLnSpc="1">
+              <a:prstTxWarp prst="textNoShape">
+                <a:avLst/>
+              </a:prstTxWarp>
+              <a:spAutoFit/>
+            </a:bodyPr>
+            <a:lstStyle/>
+            <a:p>
+              <a:pPr>
+                <a:spcAft>
+                  <a:spcPts val="1000"/>
+                </a:spcAft>
+              </a:pPr>
+              <a:r>
+                <a:rPr lang="en-GB" sz="2000" i="1" kern="100" dirty="0">
+                  <a:solidFill>
+                    <a:srgbClr val="44546A"/>
+                  </a:solidFill>
+                  <a:effectLst/>
+                  <a:latin typeface="Calibri" panose="020F0502020204030204" pitchFamily="34" charset="0"/>
+                  <a:ea typeface="DengXian" panose="02010600030101010101" pitchFamily="2" charset="-122"/>
+                  <a:cs typeface="Times New Roman" panose="02020603050405020304" pitchFamily="18" charset="0"/>
+                </a:rPr>
+                <a:t>Figure 1 Left: Illustration of adaptive MSM guided bias generation, color lines (blue to red): the biased free energy surface, black solid line: the original FES. Right: preliminary benchmark result on time needed for Na</a:t>
+              </a:r>
+              <a:r>
+                <a:rPr lang="en-GB" sz="2000" i="1" kern="100" baseline="30000" dirty="0">
+                  <a:solidFill>
+                    <a:srgbClr val="44546A"/>
+                  </a:solidFill>
+                  <a:effectLst/>
+                  <a:latin typeface="Calibri" panose="020F0502020204030204" pitchFamily="34" charset="0"/>
+                  <a:ea typeface="DengXian" panose="02010600030101010101" pitchFamily="2" charset="-122"/>
+                  <a:cs typeface="Times New Roman" panose="02020603050405020304" pitchFamily="18" charset="0"/>
+                </a:rPr>
+                <a:t>+</a:t>
+              </a:r>
+              <a:r>
+                <a:rPr lang="en-GB" sz="2000" i="1" kern="100" dirty="0">
+                  <a:solidFill>
+                    <a:srgbClr val="44546A"/>
+                  </a:solidFill>
+                  <a:effectLst/>
+                  <a:latin typeface="Calibri" panose="020F0502020204030204" pitchFamily="34" charset="0"/>
+                  <a:ea typeface="DengXian" panose="02010600030101010101" pitchFamily="2" charset="-122"/>
+                  <a:cs typeface="Times New Roman" panose="02020603050405020304" pitchFamily="18" charset="0"/>
+                </a:rPr>
+                <a:t>-Cl</a:t>
+              </a:r>
+              <a:r>
+                <a:rPr lang="en-GB" sz="2000" i="1" kern="100" baseline="30000" dirty="0">
+                  <a:solidFill>
+                    <a:srgbClr val="44546A"/>
+                  </a:solidFill>
+                  <a:effectLst/>
+                  <a:latin typeface="Calibri" panose="020F0502020204030204" pitchFamily="34" charset="0"/>
+                  <a:ea typeface="DengXian" panose="02010600030101010101" pitchFamily="2" charset="-122"/>
+                  <a:cs typeface="Times New Roman" panose="02020603050405020304" pitchFamily="18" charset="0"/>
+                </a:rPr>
+                <a:t>-</a:t>
+              </a:r>
+              <a:r>
+                <a:rPr lang="en-GB" sz="2000" i="1" kern="100" dirty="0">
+                  <a:solidFill>
+                    <a:srgbClr val="44546A"/>
+                  </a:solidFill>
+                  <a:effectLst/>
+                  <a:latin typeface="Calibri" panose="020F0502020204030204" pitchFamily="34" charset="0"/>
+                  <a:ea typeface="DengXian" panose="02010600030101010101" pitchFamily="2" charset="-122"/>
+                  <a:cs typeface="Times New Roman" panose="02020603050405020304" pitchFamily="18" charset="0"/>
+                </a:rPr>
+                <a:t> ion pair separation task.</a:t>
+              </a:r>
+            </a:p>
+          </p:txBody>
+        </p:sp>
+      </p:grpSp>
+    </p:spTree>
+    <p:extLst>
+      <p:ext uri="{BB962C8B-B14F-4D97-AF65-F5344CB8AC3E}">
+        <p14:creationId xmlns:p14="http://schemas.microsoft.com/office/powerpoint/2010/main" val="2496283995"/>
       </p:ext>
     </p:extLst>
   </p:cSld>

</xml_diff>

<commit_message>
commit to fetch remote.
</commit_message>
<xml_diff>
--- a/Tech_assignment_slides.pptx
+++ b/Tech_assignment_slides.pptx
@@ -10,8 +10,12 @@
     <p:sldId id="260" r:id="rId4"/>
     <p:sldId id="261" r:id="rId5"/>
     <p:sldId id="258" r:id="rId6"/>
-    <p:sldId id="259" r:id="rId7"/>
-    <p:sldId id="262" r:id="rId8"/>
+    <p:sldId id="263" r:id="rId7"/>
+    <p:sldId id="264" r:id="rId8"/>
+    <p:sldId id="265" r:id="rId9"/>
+    <p:sldId id="266" r:id="rId10"/>
+    <p:sldId id="259" r:id="rId11"/>
+    <p:sldId id="262" r:id="rId12"/>
   </p:sldIdLst>
   <p:sldSz cx="12192000" cy="6858000"/>
   <p:notesSz cx="6858000" cy="9144000"/>
@@ -3423,6 +3427,386 @@
 </p:sld>
 </file>
 
+<file path=ppt/slides/slide10.xml><?xml version="1.0" encoding="utf-8"?>
+<p:sld xmlns:a="http://schemas.openxmlformats.org/drawingml/2006/main" xmlns:r="http://schemas.openxmlformats.org/officeDocument/2006/relationships" xmlns:p="http://schemas.openxmlformats.org/presentationml/2006/main">
+  <p:cSld>
+    <p:spTree>
+      <p:nvGrpSpPr>
+        <p:cNvPr id="1" name=""/>
+        <p:cNvGrpSpPr/>
+        <p:nvPr/>
+      </p:nvGrpSpPr>
+      <p:grpSpPr>
+        <a:xfrm>
+          <a:off x="0" y="0"/>
+          <a:ext cx="0" cy="0"/>
+          <a:chOff x="0" y="0"/>
+          <a:chExt cx="0" cy="0"/>
+        </a:xfrm>
+      </p:grpSpPr>
+      <p:sp>
+        <p:nvSpPr>
+          <p:cNvPr id="2" name="Title 1">
+            <a:extLst>
+              <a:ext uri="{FF2B5EF4-FFF2-40B4-BE49-F238E27FC236}">
+                <a16:creationId xmlns:a16="http://schemas.microsoft.com/office/drawing/2014/main" id="{9A7D685A-9AD2-71F0-28AF-435A3A6F35E3}"/>
+              </a:ext>
+            </a:extLst>
+          </p:cNvPr>
+          <p:cNvSpPr>
+            <a:spLocks noGrp="1"/>
+          </p:cNvSpPr>
+          <p:nvPr>
+            <p:ph type="title"/>
+          </p:nvPr>
+        </p:nvSpPr>
+        <p:spPr/>
+        <p:txBody>
+          <a:bodyPr>
+            <a:normAutofit/>
+          </a:bodyPr>
+          <a:lstStyle/>
+          <a:p>
+            <a:r>
+              <a:rPr lang="en-US" sz="3200" dirty="0"/>
+              <a:t>M</a:t>
+            </a:r>
+            <a:r>
+              <a:rPr lang="en-GB" sz="3200" dirty="0" err="1"/>
+              <a:t>etaDynamics</a:t>
+            </a:r>
+            <a:r>
+              <a:rPr lang="en-GB" sz="3200" dirty="0"/>
+              <a:t> and other Enhanced Sampling techniques</a:t>
+            </a:r>
+          </a:p>
+        </p:txBody>
+      </p:sp>
+      <p:sp>
+        <p:nvSpPr>
+          <p:cNvPr id="3" name="Content Placeholder 2">
+            <a:extLst>
+              <a:ext uri="{FF2B5EF4-FFF2-40B4-BE49-F238E27FC236}">
+                <a16:creationId xmlns:a16="http://schemas.microsoft.com/office/drawing/2014/main" id="{F042AECF-7C02-950B-22B8-C209F1E30CF7}"/>
+              </a:ext>
+            </a:extLst>
+          </p:cNvPr>
+          <p:cNvSpPr>
+            <a:spLocks noGrp="1"/>
+          </p:cNvSpPr>
+          <p:nvPr>
+            <p:ph idx="1"/>
+          </p:nvPr>
+        </p:nvSpPr>
+        <p:spPr/>
+        <p:txBody>
+          <a:bodyPr/>
+          <a:lstStyle/>
+          <a:p>
+            <a:endParaRPr lang="en-GB" dirty="0"/>
+          </a:p>
+        </p:txBody>
+      </p:sp>
+    </p:spTree>
+    <p:extLst>
+      <p:ext uri="{BB962C8B-B14F-4D97-AF65-F5344CB8AC3E}">
+        <p14:creationId xmlns:p14="http://schemas.microsoft.com/office/powerpoint/2010/main" val="898478908"/>
+      </p:ext>
+    </p:extLst>
+  </p:cSld>
+  <p:clrMapOvr>
+    <a:masterClrMapping/>
+  </p:clrMapOvr>
+</p:sld>
+</file>
+
+<file path=ppt/slides/slide11.xml><?xml version="1.0" encoding="utf-8"?>
+<p:sld xmlns:a="http://schemas.openxmlformats.org/drawingml/2006/main" xmlns:r="http://schemas.openxmlformats.org/officeDocument/2006/relationships" xmlns:p="http://schemas.openxmlformats.org/presentationml/2006/main">
+  <p:cSld>
+    <p:spTree>
+      <p:nvGrpSpPr>
+        <p:cNvPr id="1" name=""/>
+        <p:cNvGrpSpPr/>
+        <p:nvPr/>
+      </p:nvGrpSpPr>
+      <p:grpSpPr>
+        <a:xfrm>
+          <a:off x="0" y="0"/>
+          <a:ext cx="0" cy="0"/>
+          <a:chOff x="0" y="0"/>
+          <a:chExt cx="0" cy="0"/>
+        </a:xfrm>
+      </p:grpSpPr>
+      <p:sp>
+        <p:nvSpPr>
+          <p:cNvPr id="2" name="Title 1">
+            <a:extLst>
+              <a:ext uri="{FF2B5EF4-FFF2-40B4-BE49-F238E27FC236}">
+                <a16:creationId xmlns:a16="http://schemas.microsoft.com/office/drawing/2014/main" id="{D38D122B-F556-35A8-399D-DE0846A08931}"/>
+              </a:ext>
+            </a:extLst>
+          </p:cNvPr>
+          <p:cNvSpPr>
+            <a:spLocks noGrp="1"/>
+          </p:cNvSpPr>
+          <p:nvPr>
+            <p:ph type="title"/>
+          </p:nvPr>
+        </p:nvSpPr>
+        <p:spPr/>
+        <p:txBody>
+          <a:bodyPr/>
+          <a:lstStyle/>
+          <a:p>
+            <a:r>
+              <a:rPr lang="en-US" dirty="0"/>
+              <a:t>A bit more on ES…</a:t>
+            </a:r>
+            <a:endParaRPr lang="en-GB" dirty="0"/>
+          </a:p>
+        </p:txBody>
+      </p:sp>
+      <p:grpSp>
+        <p:nvGrpSpPr>
+          <p:cNvPr id="4" name="Group 3">
+            <a:extLst>
+              <a:ext uri="{FF2B5EF4-FFF2-40B4-BE49-F238E27FC236}">
+                <a16:creationId xmlns:a16="http://schemas.microsoft.com/office/drawing/2014/main" id="{500AB91E-4568-3F36-BEDC-FF664443679C}"/>
+              </a:ext>
+            </a:extLst>
+          </p:cNvPr>
+          <p:cNvGrpSpPr/>
+          <p:nvPr/>
+        </p:nvGrpSpPr>
+        <p:grpSpPr>
+          <a:xfrm>
+            <a:off x="1693334" y="1775354"/>
+            <a:ext cx="8322196" cy="4431072"/>
+            <a:chOff x="-36768" y="0"/>
+            <a:chExt cx="4239198" cy="2257616"/>
+          </a:xfrm>
+        </p:grpSpPr>
+        <p:grpSp>
+          <p:nvGrpSpPr>
+            <p:cNvPr id="5" name="Group 4">
+              <a:extLst>
+                <a:ext uri="{FF2B5EF4-FFF2-40B4-BE49-F238E27FC236}">
+                  <a16:creationId xmlns:a16="http://schemas.microsoft.com/office/drawing/2014/main" id="{7B905DD4-EC57-1C8A-D8F5-7A8332464449}"/>
+                </a:ext>
+              </a:extLst>
+            </p:cNvPr>
+            <p:cNvGrpSpPr/>
+            <p:nvPr/>
+          </p:nvGrpSpPr>
+          <p:grpSpPr>
+            <a:xfrm>
+              <a:off x="0" y="0"/>
+              <a:ext cx="4202430" cy="1696085"/>
+              <a:chOff x="0" y="0"/>
+              <a:chExt cx="5016401" cy="2025521"/>
+            </a:xfrm>
+          </p:grpSpPr>
+          <p:pic>
+            <p:nvPicPr>
+              <p:cNvPr id="7" name="Picture 6">
+                <a:extLst>
+                  <a:ext uri="{FF2B5EF4-FFF2-40B4-BE49-F238E27FC236}">
+                    <a16:creationId xmlns:a16="http://schemas.microsoft.com/office/drawing/2014/main" id="{BC10A549-14EE-F006-2D8D-4A6FC574E998}"/>
+                  </a:ext>
+                </a:extLst>
+              </p:cNvPr>
+              <p:cNvPicPr>
+                <a:picLocks noChangeAspect="1"/>
+              </p:cNvPicPr>
+              <p:nvPr/>
+            </p:nvPicPr>
+            <p:blipFill>
+              <a:blip r:embed="rId2" cstate="print">
+                <a:extLst>
+                  <a:ext uri="{28A0092B-C50C-407E-A947-70E740481C1C}">
+                    <a14:useLocalDpi xmlns:a14="http://schemas.microsoft.com/office/drawing/2010/main" val="0"/>
+                  </a:ext>
+                </a:extLst>
+              </a:blip>
+              <a:srcRect/>
+              <a:stretch>
+                <a:fillRect/>
+              </a:stretch>
+            </p:blipFill>
+            <p:spPr bwMode="auto">
+              <a:xfrm>
+                <a:off x="0" y="110996"/>
+                <a:ext cx="2550160" cy="1914525"/>
+              </a:xfrm>
+              <a:prstGeom prst="rect">
+                <a:avLst/>
+              </a:prstGeom>
+              <a:noFill/>
+              <a:ln>
+                <a:noFill/>
+              </a:ln>
+            </p:spPr>
+          </p:pic>
+          <p:pic>
+            <p:nvPicPr>
+              <p:cNvPr id="8" name="Picture 7">
+                <a:extLst>
+                  <a:ext uri="{FF2B5EF4-FFF2-40B4-BE49-F238E27FC236}">
+                    <a16:creationId xmlns:a16="http://schemas.microsoft.com/office/drawing/2014/main" id="{ADE565A5-CF5E-B28F-47C8-E7B96A1D5731}"/>
+                  </a:ext>
+                </a:extLst>
+              </p:cNvPr>
+              <p:cNvPicPr>
+                <a:picLocks noChangeAspect="1"/>
+              </p:cNvPicPr>
+              <p:nvPr/>
+            </p:nvPicPr>
+            <p:blipFill>
+              <a:blip r:embed="rId3">
+                <a:extLst>
+                  <a:ext uri="{28A0092B-C50C-407E-A947-70E740481C1C}">
+                    <a14:useLocalDpi xmlns:a14="http://schemas.microsoft.com/office/drawing/2010/main" val="0"/>
+                  </a:ext>
+                </a:extLst>
+              </a:blip>
+              <a:srcRect/>
+              <a:stretch>
+                <a:fillRect/>
+              </a:stretch>
+            </p:blipFill>
+            <p:spPr bwMode="auto">
+              <a:xfrm>
+                <a:off x="2463066" y="0"/>
+                <a:ext cx="2553335" cy="1915160"/>
+              </a:xfrm>
+              <a:prstGeom prst="rect">
+                <a:avLst/>
+              </a:prstGeom>
+              <a:noFill/>
+              <a:ln>
+                <a:noFill/>
+              </a:ln>
+            </p:spPr>
+          </p:pic>
+        </p:grpSp>
+        <p:sp>
+          <p:nvSpPr>
+            <p:cNvPr id="6" name="Text Box 1">
+              <a:extLst>
+                <a:ext uri="{FF2B5EF4-FFF2-40B4-BE49-F238E27FC236}">
+                  <a16:creationId xmlns:a16="http://schemas.microsoft.com/office/drawing/2014/main" id="{4CF87EA2-8913-EC20-2B28-B7FD8935C4F5}"/>
+                </a:ext>
+              </a:extLst>
+            </p:cNvPr>
+            <p:cNvSpPr txBox="1"/>
+            <p:nvPr/>
+          </p:nvSpPr>
+          <p:spPr>
+            <a:xfrm>
+              <a:off x="-36768" y="1630372"/>
+              <a:ext cx="4127340" cy="627244"/>
+            </a:xfrm>
+            <a:prstGeom prst="rect">
+              <a:avLst/>
+            </a:prstGeom>
+            <a:solidFill>
+              <a:prstClr val="white"/>
+            </a:solidFill>
+            <a:ln>
+              <a:noFill/>
+            </a:ln>
+          </p:spPr>
+          <p:txBody>
+            <a:bodyPr rot="0" spcFirstLastPara="0" vert="horz" wrap="square" lIns="0" tIns="0" rIns="0" bIns="0" numCol="1" spcCol="0" rtlCol="0" fromWordArt="0" anchor="t" anchorCtr="0" forceAA="0" compatLnSpc="1">
+              <a:prstTxWarp prst="textNoShape">
+                <a:avLst/>
+              </a:prstTxWarp>
+              <a:spAutoFit/>
+            </a:bodyPr>
+            <a:lstStyle/>
+            <a:p>
+              <a:pPr>
+                <a:spcAft>
+                  <a:spcPts val="1000"/>
+                </a:spcAft>
+              </a:pPr>
+              <a:r>
+                <a:rPr lang="en-GB" sz="2000" i="1" kern="100" dirty="0">
+                  <a:solidFill>
+                    <a:srgbClr val="44546A"/>
+                  </a:solidFill>
+                  <a:effectLst/>
+                  <a:latin typeface="Calibri" panose="020F0502020204030204" pitchFamily="34" charset="0"/>
+                  <a:ea typeface="DengXian" panose="02010600030101010101" pitchFamily="2" charset="-122"/>
+                  <a:cs typeface="Times New Roman" panose="02020603050405020304" pitchFamily="18" charset="0"/>
+                </a:rPr>
+                <a:t>Figure 1 Left: Illustration of adaptive MSM guided bias generation, color lines (blue to red): the biased free energy surface, black solid line: the original FES. Right: preliminary benchmark result on time needed for Na</a:t>
+              </a:r>
+              <a:r>
+                <a:rPr lang="en-GB" sz="2000" i="1" kern="100" baseline="30000" dirty="0">
+                  <a:solidFill>
+                    <a:srgbClr val="44546A"/>
+                  </a:solidFill>
+                  <a:effectLst/>
+                  <a:latin typeface="Calibri" panose="020F0502020204030204" pitchFamily="34" charset="0"/>
+                  <a:ea typeface="DengXian" panose="02010600030101010101" pitchFamily="2" charset="-122"/>
+                  <a:cs typeface="Times New Roman" panose="02020603050405020304" pitchFamily="18" charset="0"/>
+                </a:rPr>
+                <a:t>+</a:t>
+              </a:r>
+              <a:r>
+                <a:rPr lang="en-GB" sz="2000" i="1" kern="100" dirty="0">
+                  <a:solidFill>
+                    <a:srgbClr val="44546A"/>
+                  </a:solidFill>
+                  <a:effectLst/>
+                  <a:latin typeface="Calibri" panose="020F0502020204030204" pitchFamily="34" charset="0"/>
+                  <a:ea typeface="DengXian" panose="02010600030101010101" pitchFamily="2" charset="-122"/>
+                  <a:cs typeface="Times New Roman" panose="02020603050405020304" pitchFamily="18" charset="0"/>
+                </a:rPr>
+                <a:t>-Cl</a:t>
+              </a:r>
+              <a:r>
+                <a:rPr lang="en-GB" sz="2000" i="1" kern="100" baseline="30000" dirty="0">
+                  <a:solidFill>
+                    <a:srgbClr val="44546A"/>
+                  </a:solidFill>
+                  <a:effectLst/>
+                  <a:latin typeface="Calibri" panose="020F0502020204030204" pitchFamily="34" charset="0"/>
+                  <a:ea typeface="DengXian" panose="02010600030101010101" pitchFamily="2" charset="-122"/>
+                  <a:cs typeface="Times New Roman" panose="02020603050405020304" pitchFamily="18" charset="0"/>
+                </a:rPr>
+                <a:t>-</a:t>
+              </a:r>
+              <a:r>
+                <a:rPr lang="en-GB" sz="2000" i="1" kern="100" dirty="0">
+                  <a:solidFill>
+                    <a:srgbClr val="44546A"/>
+                  </a:solidFill>
+                  <a:effectLst/>
+                  <a:latin typeface="Calibri" panose="020F0502020204030204" pitchFamily="34" charset="0"/>
+                  <a:ea typeface="DengXian" panose="02010600030101010101" pitchFamily="2" charset="-122"/>
+                  <a:cs typeface="Times New Roman" panose="02020603050405020304" pitchFamily="18" charset="0"/>
+                </a:rPr>
+                <a:t> ion pair separation task.</a:t>
+              </a:r>
+            </a:p>
+          </p:txBody>
+        </p:sp>
+      </p:grpSp>
+    </p:spTree>
+    <p:extLst>
+      <p:ext uri="{BB962C8B-B14F-4D97-AF65-F5344CB8AC3E}">
+        <p14:creationId xmlns:p14="http://schemas.microsoft.com/office/powerpoint/2010/main" val="2496283995"/>
+      </p:ext>
+    </p:extLst>
+  </p:cSld>
+  <p:clrMapOvr>
+    <a:masterClrMapping/>
+  </p:clrMapOvr>
+</p:sld>
+</file>
+
 <file path=ppt/slides/slide2.xml><?xml version="1.0" encoding="utf-8"?>
 <p:sld xmlns:a="http://schemas.openxmlformats.org/drawingml/2006/main" xmlns:r="http://schemas.openxmlformats.org/officeDocument/2006/relationships" xmlns:p="http://schemas.openxmlformats.org/presentationml/2006/main">
   <p:cSld>
@@ -4290,7 +4674,19 @@
                 <a:pPr lvl="1"/>
                 <a:r>
                   <a:rPr lang="en-US" dirty="0"/>
-                  <a:t>[417, 446, 449, 453, 455, 456, 475, 486, </a:t>
+                  <a:t>[417, 446, 449, 453, 455, 456, 475, </a:t>
+                </a:r>
+                <a:r>
+                  <a:rPr lang="en-US" dirty="0">
+                    <a:solidFill>
+                      <a:srgbClr val="FF0000"/>
+                    </a:solidFill>
+                  </a:rPr>
+                  <a:t>486</a:t>
+                </a:r>
+                <a:r>
+                  <a:rPr lang="en-US" dirty="0"/>
+                  <a:t>, </a:t>
                 </a:r>
                 <a:r>
                   <a:rPr lang="en-US" dirty="0">
@@ -4334,7 +4730,19 @@
                 <a:pPr lvl="1"/>
                 <a:r>
                   <a:rPr lang="en-GB" dirty="0"/>
-                  <a:t>[484, 478, 486, </a:t>
+                  <a:t>[484, 478, </a:t>
+                </a:r>
+                <a:r>
+                  <a:rPr lang="en-GB" dirty="0">
+                    <a:solidFill>
+                      <a:srgbClr val="FF0000"/>
+                    </a:solidFill>
+                  </a:rPr>
+                  <a:t>486</a:t>
+                </a:r>
+                <a:r>
+                  <a:rPr lang="en-GB" dirty="0"/>
+                  <a:t>, </a:t>
                 </a:r>
                 <a:r>
                   <a:rPr lang="en-GB" dirty="0">
@@ -4777,7 +5185,7 @@
           <p:cNvPr id="2" name="Title 1">
             <a:extLst>
               <a:ext uri="{FF2B5EF4-FFF2-40B4-BE49-F238E27FC236}">
-                <a16:creationId xmlns:a16="http://schemas.microsoft.com/office/drawing/2014/main" id="{9A7D685A-9AD2-71F0-28AF-435A3A6F35E3}"/>
+                <a16:creationId xmlns:a16="http://schemas.microsoft.com/office/drawing/2014/main" id="{79DDDB5A-5681-EDB2-C5C9-AB01E2687FF5}"/>
               </a:ext>
             </a:extLst>
           </p:cNvPr>
@@ -4790,55 +5198,119 @@
         </p:nvSpPr>
         <p:spPr/>
         <p:txBody>
-          <a:bodyPr>
-            <a:normAutofit/>
+          <a:bodyPr/>
+          <a:lstStyle/>
+          <a:p>
+            <a:r>
+              <a:rPr lang="en-US" dirty="0"/>
+              <a:t>MMGBSA per-residue decomposition</a:t>
+            </a:r>
+            <a:br>
+              <a:rPr lang="en-US" dirty="0"/>
+            </a:br>
+            <a:r>
+              <a:rPr lang="en-US" dirty="0"/>
+              <a:t>S1-Ab</a:t>
+            </a:r>
+            <a:endParaRPr lang="en-GB" dirty="0"/>
+          </a:p>
+        </p:txBody>
+      </p:sp>
+      <p:sp>
+        <p:nvSpPr>
+          <p:cNvPr id="3" name="Content Placeholder 2">
+            <a:extLst>
+              <a:ext uri="{FF2B5EF4-FFF2-40B4-BE49-F238E27FC236}">
+                <a16:creationId xmlns:a16="http://schemas.microsoft.com/office/drawing/2014/main" id="{EC3A15D6-8AF5-175D-9B99-3E79407D4CD6}"/>
+              </a:ext>
+            </a:extLst>
+          </p:cNvPr>
+          <p:cNvSpPr>
+            <a:spLocks noGrp="1"/>
+          </p:cNvSpPr>
+          <p:nvPr>
+            <p:ph idx="1"/>
+          </p:nvPr>
+        </p:nvSpPr>
+        <p:spPr/>
+        <p:txBody>
+          <a:bodyPr/>
+          <a:lstStyle/>
+          <a:p>
+            <a:endParaRPr lang="en-GB"/>
+          </a:p>
+        </p:txBody>
+      </p:sp>
+      <p:sp>
+        <p:nvSpPr>
+          <p:cNvPr id="7" name="TextBox 6">
+            <a:extLst>
+              <a:ext uri="{FF2B5EF4-FFF2-40B4-BE49-F238E27FC236}">
+                <a16:creationId xmlns:a16="http://schemas.microsoft.com/office/drawing/2014/main" id="{51E4C29B-B6C9-EF31-8D2E-0357A15DF2CE}"/>
+              </a:ext>
+            </a:extLst>
+          </p:cNvPr>
+          <p:cNvSpPr txBox="1"/>
+          <p:nvPr/>
+        </p:nvSpPr>
+        <p:spPr>
+          <a:xfrm>
+            <a:off x="406400" y="6169709"/>
+            <a:ext cx="10854266" cy="646331"/>
+          </a:xfrm>
+          <a:prstGeom prst="rect">
+            <a:avLst/>
+          </a:prstGeom>
+          <a:noFill/>
+        </p:spPr>
+        <p:txBody>
+          <a:bodyPr wrap="square">
+            <a:spAutoFit/>
           </a:bodyPr>
           <a:lstStyle/>
           <a:p>
             <a:r>
-              <a:rPr lang="en-US" sz="3200" dirty="0"/>
-              <a:t>M</a:t>
-            </a:r>
-            <a:r>
-              <a:rPr lang="en-GB" sz="3200" dirty="0" err="1"/>
-              <a:t>etaDynamics</a:t>
-            </a:r>
-            <a:r>
-              <a:rPr lang="en-GB" sz="3200" dirty="0"/>
-              <a:t> and other Enhanced Sampling techniques</a:t>
-            </a:r>
-          </a:p>
-        </p:txBody>
-      </p:sp>
-      <p:sp>
-        <p:nvSpPr>
-          <p:cNvPr id="3" name="Content Placeholder 2">
-            <a:extLst>
-              <a:ext uri="{FF2B5EF4-FFF2-40B4-BE49-F238E27FC236}">
-                <a16:creationId xmlns:a16="http://schemas.microsoft.com/office/drawing/2014/main" id="{F042AECF-7C02-950B-22B8-C209F1E30CF7}"/>
-              </a:ext>
-            </a:extLst>
-          </p:cNvPr>
-          <p:cNvSpPr>
-            <a:spLocks noGrp="1"/>
-          </p:cNvSpPr>
-          <p:nvPr>
-            <p:ph idx="1"/>
-          </p:nvPr>
-        </p:nvSpPr>
-        <p:spPr/>
-        <p:txBody>
-          <a:bodyPr/>
-          <a:lstStyle/>
-          <a:p>
-            <a:endParaRPr lang="en-GB"/>
-          </a:p>
-        </p:txBody>
-      </p:sp>
+              <a:rPr lang="en-US" dirty="0"/>
+              <a:t>Suggest the residue 486 on S1 protein contribute the most (~-9 kcal/mol), while the Ab has several key residues Tyr 33, Tyr52 and Ser53 etc.. </a:t>
+            </a:r>
+            <a:endParaRPr lang="en-GB" dirty="0"/>
+          </a:p>
+        </p:txBody>
+      </p:sp>
+      <p:pic>
+        <p:nvPicPr>
+          <p:cNvPr id="11" name="Picture 10">
+            <a:extLst>
+              <a:ext uri="{FF2B5EF4-FFF2-40B4-BE49-F238E27FC236}">
+                <a16:creationId xmlns:a16="http://schemas.microsoft.com/office/drawing/2014/main" id="{3B8686DD-5783-3845-6C8B-110E113AD99A}"/>
+              </a:ext>
+            </a:extLst>
+          </p:cNvPr>
+          <p:cNvPicPr>
+            <a:picLocks noChangeAspect="1"/>
+          </p:cNvPicPr>
+          <p:nvPr/>
+        </p:nvPicPr>
+        <p:blipFill>
+          <a:blip r:embed="rId2"/>
+          <a:stretch>
+            <a:fillRect/>
+          </a:stretch>
+        </p:blipFill>
+        <p:spPr>
+          <a:xfrm>
+            <a:off x="635000" y="1690688"/>
+            <a:ext cx="10922000" cy="4368800"/>
+          </a:xfrm>
+          <a:prstGeom prst="rect">
+            <a:avLst/>
+          </a:prstGeom>
+        </p:spPr>
+      </p:pic>
     </p:spTree>
     <p:extLst>
       <p:ext uri="{BB962C8B-B14F-4D97-AF65-F5344CB8AC3E}">
-        <p14:creationId xmlns:p14="http://schemas.microsoft.com/office/powerpoint/2010/main" val="898478908"/>
+        <p14:creationId xmlns:p14="http://schemas.microsoft.com/office/powerpoint/2010/main" val="56773650"/>
       </p:ext>
     </p:extLst>
   </p:cSld>
@@ -4870,7 +5342,7 @@
           <p:cNvPr id="2" name="Title 1">
             <a:extLst>
               <a:ext uri="{FF2B5EF4-FFF2-40B4-BE49-F238E27FC236}">
-                <a16:creationId xmlns:a16="http://schemas.microsoft.com/office/drawing/2014/main" id="{D38D122B-F556-35A8-399D-DE0846A08931}"/>
+                <a16:creationId xmlns:a16="http://schemas.microsoft.com/office/drawing/2014/main" id="{A830D7AD-9868-43D9-84F2-C7341478FE56}"/>
               </a:ext>
             </a:extLst>
           </p:cNvPr>
@@ -4888,7 +5360,480 @@
           <a:p>
             <a:r>
               <a:rPr lang="en-US" dirty="0"/>
-              <a:t>A bit more on ES…</a:t>
+              <a:t>MMGBSA per-residue decomposition</a:t>
+            </a:r>
+            <a:br>
+              <a:rPr lang="en-US" dirty="0"/>
+            </a:br>
+            <a:r>
+              <a:rPr lang="en-US" dirty="0"/>
+              <a:t>S1-Ab visualization</a:t>
+            </a:r>
+            <a:endParaRPr lang="en-GB" dirty="0"/>
+          </a:p>
+        </p:txBody>
+      </p:sp>
+      <p:pic>
+        <p:nvPicPr>
+          <p:cNvPr id="5" name="Content Placeholder 4">
+            <a:extLst>
+              <a:ext uri="{FF2B5EF4-FFF2-40B4-BE49-F238E27FC236}">
+                <a16:creationId xmlns:a16="http://schemas.microsoft.com/office/drawing/2014/main" id="{319F934D-C6D0-E433-64D6-F36B98F64222}"/>
+              </a:ext>
+            </a:extLst>
+          </p:cNvPr>
+          <p:cNvPicPr>
+            <a:picLocks noGrp="1" noChangeAspect="1"/>
+          </p:cNvPicPr>
+          <p:nvPr>
+            <p:ph idx="1"/>
+          </p:nvPr>
+        </p:nvPicPr>
+        <p:blipFill rotWithShape="1">
+          <a:blip r:embed="rId2">
+            <a:extLst>
+              <a:ext uri="{28A0092B-C50C-407E-A947-70E740481C1C}">
+                <a14:useLocalDpi xmlns:a14="http://schemas.microsoft.com/office/drawing/2010/main" val="0"/>
+              </a:ext>
+            </a:extLst>
+          </a:blip>
+          <a:srcRect l="22263" r="38513"/>
+          <a:stretch/>
+        </p:blipFill>
+        <p:spPr>
+          <a:xfrm>
+            <a:off x="575733" y="1756636"/>
+            <a:ext cx="4521200" cy="4563194"/>
+          </a:xfrm>
+        </p:spPr>
+      </p:pic>
+      <p:sp>
+        <p:nvSpPr>
+          <p:cNvPr id="7" name="TextBox 6">
+            <a:extLst>
+              <a:ext uri="{FF2B5EF4-FFF2-40B4-BE49-F238E27FC236}">
+                <a16:creationId xmlns:a16="http://schemas.microsoft.com/office/drawing/2014/main" id="{D021D69F-4967-A3A5-58E0-667FBD6F7604}"/>
+              </a:ext>
+            </a:extLst>
+          </p:cNvPr>
+          <p:cNvSpPr txBox="1"/>
+          <p:nvPr/>
+        </p:nvSpPr>
+        <p:spPr>
+          <a:xfrm>
+            <a:off x="2057400" y="2311400"/>
+            <a:ext cx="891591" cy="369332"/>
+          </a:xfrm>
+          <a:prstGeom prst="rect">
+            <a:avLst/>
+          </a:prstGeom>
+          <a:noFill/>
+        </p:spPr>
+        <p:txBody>
+          <a:bodyPr wrap="none" rtlCol="0">
+            <a:spAutoFit/>
+          </a:bodyPr>
+          <a:lstStyle/>
+          <a:p>
+            <a:r>
+              <a:rPr lang="en-US" dirty="0"/>
+              <a:t>Phe486</a:t>
+            </a:r>
+            <a:endParaRPr lang="en-GB" dirty="0"/>
+          </a:p>
+        </p:txBody>
+      </p:sp>
+      <p:sp>
+        <p:nvSpPr>
+          <p:cNvPr id="8" name="TextBox 7">
+            <a:extLst>
+              <a:ext uri="{FF2B5EF4-FFF2-40B4-BE49-F238E27FC236}">
+                <a16:creationId xmlns:a16="http://schemas.microsoft.com/office/drawing/2014/main" id="{F624847E-7836-A54C-161B-2B4581E43433}"/>
+              </a:ext>
+            </a:extLst>
+          </p:cNvPr>
+          <p:cNvSpPr txBox="1"/>
+          <p:nvPr/>
+        </p:nvSpPr>
+        <p:spPr>
+          <a:xfrm>
+            <a:off x="3725333" y="2396066"/>
+            <a:ext cx="704808" cy="369332"/>
+          </a:xfrm>
+          <a:prstGeom prst="rect">
+            <a:avLst/>
+          </a:prstGeom>
+          <a:noFill/>
+        </p:spPr>
+        <p:txBody>
+          <a:bodyPr wrap="none" rtlCol="0">
+            <a:spAutoFit/>
+          </a:bodyPr>
+          <a:lstStyle/>
+          <a:p>
+            <a:r>
+              <a:rPr lang="en-US" dirty="0"/>
+              <a:t>Tyr52</a:t>
+            </a:r>
+          </a:p>
+        </p:txBody>
+      </p:sp>
+      <p:sp>
+        <p:nvSpPr>
+          <p:cNvPr id="9" name="TextBox 8">
+            <a:extLst>
+              <a:ext uri="{FF2B5EF4-FFF2-40B4-BE49-F238E27FC236}">
+                <a16:creationId xmlns:a16="http://schemas.microsoft.com/office/drawing/2014/main" id="{BE7E12EA-C81A-B145-CB2C-53AD49F51BD2}"/>
+              </a:ext>
+            </a:extLst>
+          </p:cNvPr>
+          <p:cNvSpPr txBox="1"/>
+          <p:nvPr/>
+        </p:nvSpPr>
+        <p:spPr>
+          <a:xfrm>
+            <a:off x="4656667" y="3327400"/>
+            <a:ext cx="704808" cy="369332"/>
+          </a:xfrm>
+          <a:prstGeom prst="rect">
+            <a:avLst/>
+          </a:prstGeom>
+          <a:noFill/>
+        </p:spPr>
+        <p:txBody>
+          <a:bodyPr wrap="none" rtlCol="0">
+            <a:spAutoFit/>
+          </a:bodyPr>
+          <a:lstStyle/>
+          <a:p>
+            <a:r>
+              <a:rPr lang="en-US" dirty="0"/>
+              <a:t>Tyr33</a:t>
+            </a:r>
+          </a:p>
+        </p:txBody>
+      </p:sp>
+      <p:sp>
+        <p:nvSpPr>
+          <p:cNvPr id="10" name="TextBox 9">
+            <a:extLst>
+              <a:ext uri="{FF2B5EF4-FFF2-40B4-BE49-F238E27FC236}">
+                <a16:creationId xmlns:a16="http://schemas.microsoft.com/office/drawing/2014/main" id="{87083C07-9259-15C2-1D5F-EBC8BBEF199D}"/>
+              </a:ext>
+            </a:extLst>
+          </p:cNvPr>
+          <p:cNvSpPr txBox="1"/>
+          <p:nvPr/>
+        </p:nvSpPr>
+        <p:spPr>
+          <a:xfrm>
+            <a:off x="4392125" y="4495016"/>
+            <a:ext cx="720069" cy="369332"/>
+          </a:xfrm>
+          <a:prstGeom prst="rect">
+            <a:avLst/>
+          </a:prstGeom>
+          <a:noFill/>
+        </p:spPr>
+        <p:txBody>
+          <a:bodyPr wrap="none" rtlCol="0">
+            <a:spAutoFit/>
+          </a:bodyPr>
+          <a:lstStyle/>
+          <a:p>
+            <a:r>
+              <a:rPr lang="en-US" dirty="0"/>
+              <a:t>Ser53</a:t>
+            </a:r>
+          </a:p>
+        </p:txBody>
+      </p:sp>
+      <p:sp>
+        <p:nvSpPr>
+          <p:cNvPr id="11" name="TextBox 10">
+            <a:extLst>
+              <a:ext uri="{FF2B5EF4-FFF2-40B4-BE49-F238E27FC236}">
+                <a16:creationId xmlns:a16="http://schemas.microsoft.com/office/drawing/2014/main" id="{041A0898-26E4-A1C6-3258-E9AFDC2765EC}"/>
+              </a:ext>
+            </a:extLst>
+          </p:cNvPr>
+          <p:cNvSpPr txBox="1"/>
+          <p:nvPr/>
+        </p:nvSpPr>
+        <p:spPr>
+          <a:xfrm>
+            <a:off x="5993922" y="2324972"/>
+            <a:ext cx="5359878" cy="1754326"/>
+          </a:xfrm>
+          <a:prstGeom prst="rect">
+            <a:avLst/>
+          </a:prstGeom>
+          <a:noFill/>
+        </p:spPr>
+        <p:txBody>
+          <a:bodyPr wrap="square" rtlCol="0">
+            <a:spAutoFit/>
+          </a:bodyPr>
+          <a:lstStyle/>
+          <a:p>
+            <a:r>
+              <a:rPr lang="en-US" dirty="0"/>
+              <a:t>Good agreement with the literature.</a:t>
+            </a:r>
+          </a:p>
+          <a:p>
+            <a:endParaRPr lang="en-US" dirty="0"/>
+          </a:p>
+          <a:p>
+            <a:r>
+              <a:rPr lang="en-US" dirty="0"/>
+              <a:t>Close contact:</a:t>
+            </a:r>
+          </a:p>
+          <a:p>
+            <a:r>
+              <a:rPr lang="en-US" dirty="0"/>
+              <a:t>between the </a:t>
+            </a:r>
+            <a:r>
+              <a:rPr lang="en-US" dirty="0">
+                <a:solidFill>
+                  <a:srgbClr val="3C86D4"/>
+                </a:solidFill>
+              </a:rPr>
+              <a:t>Phe486 on S1 protein (blue)</a:t>
+            </a:r>
+          </a:p>
+          <a:p>
+            <a:r>
+              <a:rPr lang="en-US" dirty="0"/>
+              <a:t>with </a:t>
+            </a:r>
+            <a:r>
+              <a:rPr lang="en-US" dirty="0">
+                <a:solidFill>
+                  <a:srgbClr val="963232"/>
+                </a:solidFill>
+              </a:rPr>
+              <a:t>Tyr52, Tyr33 and Ser53 on </a:t>
+            </a:r>
+            <a:endParaRPr lang="en-GB" dirty="0">
+              <a:solidFill>
+                <a:srgbClr val="963232"/>
+              </a:solidFill>
+            </a:endParaRPr>
+          </a:p>
+          <a:p>
+            <a:r>
+              <a:rPr lang="en-US" dirty="0">
+                <a:solidFill>
+                  <a:srgbClr val="963232"/>
+                </a:solidFill>
+              </a:rPr>
+              <a:t>Antibody P5A3C8 (THSC20.HVTR26) (red)</a:t>
+            </a:r>
+          </a:p>
+        </p:txBody>
+      </p:sp>
+    </p:spTree>
+    <p:extLst>
+      <p:ext uri="{BB962C8B-B14F-4D97-AF65-F5344CB8AC3E}">
+        <p14:creationId xmlns:p14="http://schemas.microsoft.com/office/powerpoint/2010/main" val="3721598616"/>
+      </p:ext>
+    </p:extLst>
+  </p:cSld>
+  <p:clrMapOvr>
+    <a:masterClrMapping/>
+  </p:clrMapOvr>
+</p:sld>
+</file>
+
+<file path=ppt/slides/slide8.xml><?xml version="1.0" encoding="utf-8"?>
+<p:sld xmlns:a="http://schemas.openxmlformats.org/drawingml/2006/main" xmlns:r="http://schemas.openxmlformats.org/officeDocument/2006/relationships" xmlns:p="http://schemas.openxmlformats.org/presentationml/2006/main">
+  <p:cSld>
+    <p:spTree>
+      <p:nvGrpSpPr>
+        <p:cNvPr id="1" name=""/>
+        <p:cNvGrpSpPr/>
+        <p:nvPr/>
+      </p:nvGrpSpPr>
+      <p:grpSpPr>
+        <a:xfrm>
+          <a:off x="0" y="0"/>
+          <a:ext cx="0" cy="0"/>
+          <a:chOff x="0" y="0"/>
+          <a:chExt cx="0" cy="0"/>
+        </a:xfrm>
+      </p:grpSpPr>
+      <p:pic>
+        <p:nvPicPr>
+          <p:cNvPr id="10" name="Picture 9">
+            <a:extLst>
+              <a:ext uri="{FF2B5EF4-FFF2-40B4-BE49-F238E27FC236}">
+                <a16:creationId xmlns:a16="http://schemas.microsoft.com/office/drawing/2014/main" id="{7B011781-E9CF-EA96-2EAB-FB4BDF2D0331}"/>
+              </a:ext>
+            </a:extLst>
+          </p:cNvPr>
+          <p:cNvPicPr>
+            <a:picLocks noChangeAspect="1"/>
+          </p:cNvPicPr>
+          <p:nvPr/>
+        </p:nvPicPr>
+        <p:blipFill>
+          <a:blip r:embed="rId2"/>
+          <a:stretch>
+            <a:fillRect/>
+          </a:stretch>
+        </p:blipFill>
+        <p:spPr>
+          <a:xfrm>
+            <a:off x="668867" y="1383625"/>
+            <a:ext cx="10854266" cy="4341706"/>
+          </a:xfrm>
+          <a:prstGeom prst="rect">
+            <a:avLst/>
+          </a:prstGeom>
+        </p:spPr>
+      </p:pic>
+      <p:sp>
+        <p:nvSpPr>
+          <p:cNvPr id="2" name="Title 1">
+            <a:extLst>
+              <a:ext uri="{FF2B5EF4-FFF2-40B4-BE49-F238E27FC236}">
+                <a16:creationId xmlns:a16="http://schemas.microsoft.com/office/drawing/2014/main" id="{17B948BA-7D3A-21CC-066D-51015FE9C686}"/>
+              </a:ext>
+            </a:extLst>
+          </p:cNvPr>
+          <p:cNvSpPr>
+            <a:spLocks noGrp="1"/>
+          </p:cNvSpPr>
+          <p:nvPr>
+            <p:ph type="title"/>
+          </p:nvPr>
+        </p:nvSpPr>
+        <p:spPr/>
+        <p:txBody>
+          <a:bodyPr/>
+          <a:lstStyle/>
+          <a:p>
+            <a:r>
+              <a:rPr lang="en-US" dirty="0"/>
+              <a:t>MMGBSA per-residue decomposition</a:t>
+            </a:r>
+            <a:br>
+              <a:rPr lang="en-US" dirty="0"/>
+            </a:br>
+            <a:r>
+              <a:rPr lang="en-US" dirty="0"/>
+              <a:t>S1-ACE2</a:t>
+            </a:r>
+            <a:endParaRPr lang="en-GB" dirty="0"/>
+          </a:p>
+        </p:txBody>
+      </p:sp>
+      <p:sp>
+        <p:nvSpPr>
+          <p:cNvPr id="8" name="TextBox 7">
+            <a:extLst>
+              <a:ext uri="{FF2B5EF4-FFF2-40B4-BE49-F238E27FC236}">
+                <a16:creationId xmlns:a16="http://schemas.microsoft.com/office/drawing/2014/main" id="{F310A76F-1E28-2DAB-86FC-A31F8B3E0525}"/>
+              </a:ext>
+            </a:extLst>
+          </p:cNvPr>
+          <p:cNvSpPr txBox="1"/>
+          <p:nvPr/>
+        </p:nvSpPr>
+        <p:spPr>
+          <a:xfrm>
+            <a:off x="601134" y="5725331"/>
+            <a:ext cx="10854266" cy="923330"/>
+          </a:xfrm>
+          <a:prstGeom prst="rect">
+            <a:avLst/>
+          </a:prstGeom>
+          <a:noFill/>
+        </p:spPr>
+        <p:txBody>
+          <a:bodyPr wrap="square">
+            <a:spAutoFit/>
+          </a:bodyPr>
+          <a:lstStyle/>
+          <a:p>
+            <a:r>
+              <a:rPr lang="en-US" dirty="0"/>
+              <a:t>Phe486 contribute ~-3.4 kcal/mol, less than S1-Ab scenario. While the Gln498 contributes the most ~-5.9 kcal/mol.</a:t>
+            </a:r>
+          </a:p>
+          <a:p>
+            <a:r>
+              <a:rPr lang="en-US" dirty="0"/>
+              <a:t>On the other hand, ACE has 3 residues contribute the most: Lys31 (~-3.8 kcal/mol), Asp41 (~-2.9 kcal/mol) Tyr38 ( ~-3.7 kcal/mol).</a:t>
+            </a:r>
+            <a:endParaRPr lang="en-GB" dirty="0"/>
+          </a:p>
+        </p:txBody>
+      </p:sp>
+    </p:spTree>
+    <p:extLst>
+      <p:ext uri="{BB962C8B-B14F-4D97-AF65-F5344CB8AC3E}">
+        <p14:creationId xmlns:p14="http://schemas.microsoft.com/office/powerpoint/2010/main" val="4143901046"/>
+      </p:ext>
+    </p:extLst>
+  </p:cSld>
+  <p:clrMapOvr>
+    <a:masterClrMapping/>
+  </p:clrMapOvr>
+</p:sld>
+</file>
+
+<file path=ppt/slides/slide9.xml><?xml version="1.0" encoding="utf-8"?>
+<p:sld xmlns:a="http://schemas.openxmlformats.org/drawingml/2006/main" xmlns:r="http://schemas.openxmlformats.org/officeDocument/2006/relationships" xmlns:p="http://schemas.openxmlformats.org/presentationml/2006/main">
+  <p:cSld>
+    <p:spTree>
+      <p:nvGrpSpPr>
+        <p:cNvPr id="1" name=""/>
+        <p:cNvGrpSpPr/>
+        <p:nvPr/>
+      </p:nvGrpSpPr>
+      <p:grpSpPr>
+        <a:xfrm>
+          <a:off x="0" y="0"/>
+          <a:ext cx="0" cy="0"/>
+          <a:chOff x="0" y="0"/>
+          <a:chExt cx="0" cy="0"/>
+        </a:xfrm>
+      </p:grpSpPr>
+      <p:sp>
+        <p:nvSpPr>
+          <p:cNvPr id="2" name="Title 1">
+            <a:extLst>
+              <a:ext uri="{FF2B5EF4-FFF2-40B4-BE49-F238E27FC236}">
+                <a16:creationId xmlns:a16="http://schemas.microsoft.com/office/drawing/2014/main" id="{17B948BA-7D3A-21CC-066D-51015FE9C686}"/>
+              </a:ext>
+            </a:extLst>
+          </p:cNvPr>
+          <p:cNvSpPr>
+            <a:spLocks noGrp="1"/>
+          </p:cNvSpPr>
+          <p:nvPr>
+            <p:ph type="title"/>
+          </p:nvPr>
+        </p:nvSpPr>
+        <p:spPr/>
+        <p:txBody>
+          <a:bodyPr/>
+          <a:lstStyle/>
+          <a:p>
+            <a:r>
+              <a:rPr lang="en-US" dirty="0"/>
+              <a:t>MMGBSA per-residue decomposition</a:t>
+            </a:r>
+            <a:br>
+              <a:rPr lang="en-US" dirty="0"/>
+            </a:br>
+            <a:r>
+              <a:rPr lang="en-US" dirty="0"/>
+              <a:t>S1-ACE2</a:t>
             </a:r>
             <a:endParaRPr lang="en-GB" dirty="0"/>
           </a:p>
@@ -4896,10 +5841,10 @@
       </p:sp>
       <p:grpSp>
         <p:nvGrpSpPr>
-          <p:cNvPr id="4" name="Group 3">
-            <a:extLst>
-              <a:ext uri="{FF2B5EF4-FFF2-40B4-BE49-F238E27FC236}">
-                <a16:creationId xmlns:a16="http://schemas.microsoft.com/office/drawing/2014/main" id="{500AB91E-4568-3F36-BEDC-FF664443679C}"/>
+          <p:cNvPr id="30" name="Group 29">
+            <a:extLst>
+              <a:ext uri="{FF2B5EF4-FFF2-40B4-BE49-F238E27FC236}">
+                <a16:creationId xmlns:a16="http://schemas.microsoft.com/office/drawing/2014/main" id="{B948B7FE-6F1E-18AE-AF15-DBDF9917BB98}"/>
               </a:ext>
             </a:extLst>
           </p:cNvPr>
@@ -4908,18 +5853,519 @@
         </p:nvGrpSpPr>
         <p:grpSpPr>
           <a:xfrm>
-            <a:off x="1693334" y="1775354"/>
-            <a:ext cx="8322196" cy="4431072"/>
-            <a:chOff x="-36768" y="0"/>
-            <a:chExt cx="4239198" cy="2257616"/>
+            <a:off x="537209" y="4184120"/>
+            <a:ext cx="3364396" cy="2523065"/>
+            <a:chOff x="39743" y="4213753"/>
+            <a:chExt cx="3364396" cy="2523065"/>
+          </a:xfrm>
+        </p:grpSpPr>
+        <p:pic>
+          <p:nvPicPr>
+            <p:cNvPr id="4" name="Picture 3">
+              <a:extLst>
+                <a:ext uri="{FF2B5EF4-FFF2-40B4-BE49-F238E27FC236}">
+                  <a16:creationId xmlns:a16="http://schemas.microsoft.com/office/drawing/2014/main" id="{D5CC6B3F-8F4F-C48D-7E1A-E5AAC4E3FBB0}"/>
+                </a:ext>
+              </a:extLst>
+            </p:cNvPr>
+            <p:cNvPicPr>
+              <a:picLocks noChangeAspect="1"/>
+            </p:cNvPicPr>
+            <p:nvPr/>
+          </p:nvPicPr>
+          <p:blipFill>
+            <a:blip r:embed="rId2">
+              <a:extLst>
+                <a:ext uri="{28A0092B-C50C-407E-A947-70E740481C1C}">
+                  <a14:useLocalDpi xmlns:a14="http://schemas.microsoft.com/office/drawing/2010/main" val="0"/>
+                </a:ext>
+              </a:extLst>
+            </a:blip>
+            <a:stretch>
+              <a:fillRect/>
+            </a:stretch>
+          </p:blipFill>
+          <p:spPr>
+            <a:xfrm>
+              <a:off x="931334" y="4213753"/>
+              <a:ext cx="2472805" cy="2523065"/>
+            </a:xfrm>
+            <a:prstGeom prst="rect">
+              <a:avLst/>
+            </a:prstGeom>
+          </p:spPr>
+        </p:pic>
+        <p:sp>
+          <p:nvSpPr>
+            <p:cNvPr id="9" name="TextBox 8">
+              <a:extLst>
+                <a:ext uri="{FF2B5EF4-FFF2-40B4-BE49-F238E27FC236}">
+                  <a16:creationId xmlns:a16="http://schemas.microsoft.com/office/drawing/2014/main" id="{D677ECE8-2DD3-8B3F-D300-613F8826A400}"/>
+                </a:ext>
+              </a:extLst>
+            </p:cNvPr>
+            <p:cNvSpPr txBox="1"/>
+            <p:nvPr/>
+          </p:nvSpPr>
+          <p:spPr>
+            <a:xfrm>
+              <a:off x="39743" y="5354650"/>
+              <a:ext cx="891591" cy="369332"/>
+            </a:xfrm>
+            <a:prstGeom prst="rect">
+              <a:avLst/>
+            </a:prstGeom>
+            <a:noFill/>
+          </p:spPr>
+          <p:txBody>
+            <a:bodyPr wrap="none" rtlCol="0">
+              <a:spAutoFit/>
+            </a:bodyPr>
+            <a:lstStyle/>
+            <a:p>
+              <a:r>
+                <a:rPr lang="en-US" dirty="0"/>
+                <a:t>Phe486</a:t>
+              </a:r>
+              <a:endParaRPr lang="en-GB" dirty="0"/>
+            </a:p>
+          </p:txBody>
+        </p:sp>
+        <p:sp>
+          <p:nvSpPr>
+            <p:cNvPr id="10" name="TextBox 9">
+              <a:extLst>
+                <a:ext uri="{FF2B5EF4-FFF2-40B4-BE49-F238E27FC236}">
+                  <a16:creationId xmlns:a16="http://schemas.microsoft.com/office/drawing/2014/main" id="{4CB85CA9-E1FC-79E9-F045-7C0555F7767B}"/>
+                </a:ext>
+              </a:extLst>
+            </p:cNvPr>
+            <p:cNvSpPr txBox="1"/>
+            <p:nvPr/>
+          </p:nvSpPr>
+          <p:spPr>
+            <a:xfrm>
+              <a:off x="2664834" y="5475285"/>
+              <a:ext cx="739305" cy="369332"/>
+            </a:xfrm>
+            <a:prstGeom prst="rect">
+              <a:avLst/>
+            </a:prstGeom>
+            <a:noFill/>
+          </p:spPr>
+          <p:txBody>
+            <a:bodyPr wrap="none" rtlCol="0">
+              <a:spAutoFit/>
+            </a:bodyPr>
+            <a:lstStyle/>
+            <a:p>
+              <a:r>
+                <a:rPr lang="en-US" dirty="0"/>
+                <a:t>Gln24</a:t>
+              </a:r>
+              <a:endParaRPr lang="en-GB" dirty="0"/>
+            </a:p>
+          </p:txBody>
+        </p:sp>
+        <p:cxnSp>
+          <p:nvCxnSpPr>
+            <p:cNvPr id="12" name="Straight Connector 11">
+              <a:extLst>
+                <a:ext uri="{FF2B5EF4-FFF2-40B4-BE49-F238E27FC236}">
+                  <a16:creationId xmlns:a16="http://schemas.microsoft.com/office/drawing/2014/main" id="{76AD8E0F-25BD-5274-7F1B-619D6A859229}"/>
+                </a:ext>
+              </a:extLst>
+            </p:cNvPr>
+            <p:cNvCxnSpPr>
+              <a:cxnSpLocks/>
+            </p:cNvCxnSpPr>
+            <p:nvPr/>
+          </p:nvCxnSpPr>
+          <p:spPr>
+            <a:xfrm flipV="1">
+              <a:off x="485538" y="5167312"/>
+              <a:ext cx="1173928" cy="187338"/>
+            </a:xfrm>
+            <a:prstGeom prst="line">
+              <a:avLst/>
+            </a:prstGeom>
+            <a:ln w="28575"/>
+          </p:spPr>
+          <p:style>
+            <a:lnRef idx="1">
+              <a:schemeClr val="accent1"/>
+            </a:lnRef>
+            <a:fillRef idx="0">
+              <a:schemeClr val="accent1"/>
+            </a:fillRef>
+            <a:effectRef idx="0">
+              <a:schemeClr val="accent1"/>
+            </a:effectRef>
+            <a:fontRef idx="minor">
+              <a:schemeClr val="tx1"/>
+            </a:fontRef>
+          </p:style>
+        </p:cxnSp>
+        <p:cxnSp>
+          <p:nvCxnSpPr>
+            <p:cNvPr id="13" name="Straight Connector 12">
+              <a:extLst>
+                <a:ext uri="{FF2B5EF4-FFF2-40B4-BE49-F238E27FC236}">
+                  <a16:creationId xmlns:a16="http://schemas.microsoft.com/office/drawing/2014/main" id="{720B4670-E19F-3DC3-7D43-B3DD6B9D2AC6}"/>
+                </a:ext>
+              </a:extLst>
+            </p:cNvPr>
+            <p:cNvCxnSpPr>
+              <a:cxnSpLocks/>
+            </p:cNvCxnSpPr>
+            <p:nvPr/>
+          </p:nvCxnSpPr>
+          <p:spPr>
+            <a:xfrm>
+              <a:off x="2347857" y="5184781"/>
+              <a:ext cx="406400" cy="339738"/>
+            </a:xfrm>
+            <a:prstGeom prst="line">
+              <a:avLst/>
+            </a:prstGeom>
+            <a:ln w="28575">
+              <a:solidFill>
+                <a:srgbClr val="7A7A7A"/>
+              </a:solidFill>
+            </a:ln>
+          </p:spPr>
+          <p:style>
+            <a:lnRef idx="1">
+              <a:schemeClr val="accent1"/>
+            </a:lnRef>
+            <a:fillRef idx="0">
+              <a:schemeClr val="accent1"/>
+            </a:fillRef>
+            <a:effectRef idx="0">
+              <a:schemeClr val="accent1"/>
+            </a:effectRef>
+            <a:fontRef idx="minor">
+              <a:schemeClr val="tx1"/>
+            </a:fontRef>
+          </p:style>
+        </p:cxnSp>
+      </p:grpSp>
+      <p:grpSp>
+        <p:nvGrpSpPr>
+          <p:cNvPr id="29" name="Group 28">
+            <a:extLst>
+              <a:ext uri="{FF2B5EF4-FFF2-40B4-BE49-F238E27FC236}">
+                <a16:creationId xmlns:a16="http://schemas.microsoft.com/office/drawing/2014/main" id="{98E57841-4789-BBBC-6110-80DCE9DF1996}"/>
+              </a:ext>
+            </a:extLst>
+          </p:cNvPr>
+          <p:cNvGrpSpPr/>
+          <p:nvPr/>
+        </p:nvGrpSpPr>
+        <p:grpSpPr>
+          <a:xfrm>
+            <a:off x="622417" y="1661055"/>
+            <a:ext cx="3279188" cy="2523065"/>
+            <a:chOff x="124951" y="1690688"/>
+            <a:chExt cx="3279188" cy="2523065"/>
+          </a:xfrm>
+        </p:grpSpPr>
+        <p:pic>
+          <p:nvPicPr>
+            <p:cNvPr id="7" name="Picture 6">
+              <a:extLst>
+                <a:ext uri="{FF2B5EF4-FFF2-40B4-BE49-F238E27FC236}">
+                  <a16:creationId xmlns:a16="http://schemas.microsoft.com/office/drawing/2014/main" id="{673EE3B9-C92E-53F6-AA72-0B9DA7B71301}"/>
+                </a:ext>
+              </a:extLst>
+            </p:cNvPr>
+            <p:cNvPicPr>
+              <a:picLocks noChangeAspect="1"/>
+            </p:cNvPicPr>
+            <p:nvPr/>
+          </p:nvPicPr>
+          <p:blipFill>
+            <a:blip r:embed="rId3">
+              <a:extLst>
+                <a:ext uri="{28A0092B-C50C-407E-A947-70E740481C1C}">
+                  <a14:useLocalDpi xmlns:a14="http://schemas.microsoft.com/office/drawing/2010/main" val="0"/>
+                </a:ext>
+              </a:extLst>
+            </a:blip>
+            <a:stretch>
+              <a:fillRect/>
+            </a:stretch>
+          </p:blipFill>
+          <p:spPr>
+            <a:xfrm>
+              <a:off x="931334" y="1690688"/>
+              <a:ext cx="2472805" cy="2523065"/>
+            </a:xfrm>
+            <a:prstGeom prst="rect">
+              <a:avLst/>
+            </a:prstGeom>
+          </p:spPr>
+        </p:pic>
+        <p:sp>
+          <p:nvSpPr>
+            <p:cNvPr id="17" name="TextBox 16">
+              <a:extLst>
+                <a:ext uri="{FF2B5EF4-FFF2-40B4-BE49-F238E27FC236}">
+                  <a16:creationId xmlns:a16="http://schemas.microsoft.com/office/drawing/2014/main" id="{54EE1814-FC12-D053-F4F1-B983698C1D57}"/>
+                </a:ext>
+              </a:extLst>
+            </p:cNvPr>
+            <p:cNvSpPr txBox="1"/>
+            <p:nvPr/>
+          </p:nvSpPr>
+          <p:spPr>
+            <a:xfrm>
+              <a:off x="1087983" y="1901226"/>
+              <a:ext cx="739305" cy="369332"/>
+            </a:xfrm>
+            <a:prstGeom prst="rect">
+              <a:avLst/>
+            </a:prstGeom>
+            <a:noFill/>
+          </p:spPr>
+          <p:txBody>
+            <a:bodyPr wrap="square" rtlCol="0">
+              <a:spAutoFit/>
+            </a:bodyPr>
+            <a:lstStyle/>
+            <a:p>
+              <a:r>
+                <a:rPr lang="en-US" dirty="0"/>
+                <a:t>Lys31</a:t>
+              </a:r>
+              <a:endParaRPr lang="en-GB" dirty="0"/>
+            </a:p>
+          </p:txBody>
+        </p:sp>
+        <p:cxnSp>
+          <p:nvCxnSpPr>
+            <p:cNvPr id="18" name="Straight Connector 17">
+              <a:extLst>
+                <a:ext uri="{FF2B5EF4-FFF2-40B4-BE49-F238E27FC236}">
+                  <a16:creationId xmlns:a16="http://schemas.microsoft.com/office/drawing/2014/main" id="{C0D306EF-D8C9-F8E4-9DE1-273CBF62777E}"/>
+                </a:ext>
+              </a:extLst>
+            </p:cNvPr>
+            <p:cNvCxnSpPr>
+              <a:cxnSpLocks/>
+            </p:cNvCxnSpPr>
+            <p:nvPr/>
+          </p:nvCxnSpPr>
+          <p:spPr>
+            <a:xfrm flipH="1" flipV="1">
+              <a:off x="1498601" y="2267102"/>
+              <a:ext cx="524933" cy="502180"/>
+            </a:xfrm>
+            <a:prstGeom prst="line">
+              <a:avLst/>
+            </a:prstGeom>
+            <a:ln w="28575">
+              <a:solidFill>
+                <a:srgbClr val="7A7A7A"/>
+              </a:solidFill>
+            </a:ln>
+          </p:spPr>
+          <p:style>
+            <a:lnRef idx="1">
+              <a:schemeClr val="accent1"/>
+            </a:lnRef>
+            <a:fillRef idx="0">
+              <a:schemeClr val="accent1"/>
+            </a:fillRef>
+            <a:effectRef idx="0">
+              <a:schemeClr val="accent1"/>
+            </a:effectRef>
+            <a:fontRef idx="minor">
+              <a:schemeClr val="tx1"/>
+            </a:fontRef>
+          </p:style>
+        </p:cxnSp>
+        <p:sp>
+          <p:nvSpPr>
+            <p:cNvPr id="21" name="TextBox 20">
+              <a:extLst>
+                <a:ext uri="{FF2B5EF4-FFF2-40B4-BE49-F238E27FC236}">
+                  <a16:creationId xmlns:a16="http://schemas.microsoft.com/office/drawing/2014/main" id="{83A3B6D7-2539-3D16-0378-A778AA13672F}"/>
+                </a:ext>
+              </a:extLst>
+            </p:cNvPr>
+            <p:cNvSpPr txBox="1"/>
+            <p:nvPr/>
+          </p:nvSpPr>
+          <p:spPr>
+            <a:xfrm>
+              <a:off x="124951" y="2646919"/>
+              <a:ext cx="739305" cy="369332"/>
+            </a:xfrm>
+            <a:prstGeom prst="rect">
+              <a:avLst/>
+            </a:prstGeom>
+            <a:noFill/>
+          </p:spPr>
+          <p:txBody>
+            <a:bodyPr wrap="square" rtlCol="0">
+              <a:spAutoFit/>
+            </a:bodyPr>
+            <a:lstStyle/>
+            <a:p>
+              <a:r>
+                <a:rPr lang="en-US" dirty="0"/>
+                <a:t>His34</a:t>
+              </a:r>
+              <a:endParaRPr lang="en-GB" dirty="0"/>
+            </a:p>
+          </p:txBody>
+        </p:sp>
+        <p:cxnSp>
+          <p:nvCxnSpPr>
+            <p:cNvPr id="22" name="Straight Connector 21">
+              <a:extLst>
+                <a:ext uri="{FF2B5EF4-FFF2-40B4-BE49-F238E27FC236}">
+                  <a16:creationId xmlns:a16="http://schemas.microsoft.com/office/drawing/2014/main" id="{49077C7F-E96F-F01B-89CF-19443A917E83}"/>
+                </a:ext>
+              </a:extLst>
+            </p:cNvPr>
+            <p:cNvCxnSpPr>
+              <a:cxnSpLocks/>
+            </p:cNvCxnSpPr>
+            <p:nvPr/>
+          </p:nvCxnSpPr>
+          <p:spPr>
+            <a:xfrm flipH="1" flipV="1">
+              <a:off x="838200" y="2884069"/>
+              <a:ext cx="821266" cy="44694"/>
+            </a:xfrm>
+            <a:prstGeom prst="line">
+              <a:avLst/>
+            </a:prstGeom>
+            <a:ln w="28575">
+              <a:solidFill>
+                <a:srgbClr val="7A7A7A"/>
+              </a:solidFill>
+            </a:ln>
+          </p:spPr>
+          <p:style>
+            <a:lnRef idx="1">
+              <a:schemeClr val="accent1"/>
+            </a:lnRef>
+            <a:fillRef idx="0">
+              <a:schemeClr val="accent1"/>
+            </a:fillRef>
+            <a:effectRef idx="0">
+              <a:schemeClr val="accent1"/>
+            </a:effectRef>
+            <a:fontRef idx="minor">
+              <a:schemeClr val="tx1"/>
+            </a:fontRef>
+          </p:style>
+        </p:cxnSp>
+        <p:sp>
+          <p:nvSpPr>
+            <p:cNvPr id="25" name="TextBox 24">
+              <a:extLst>
+                <a:ext uri="{FF2B5EF4-FFF2-40B4-BE49-F238E27FC236}">
+                  <a16:creationId xmlns:a16="http://schemas.microsoft.com/office/drawing/2014/main" id="{8CBC4893-19FD-38BD-3291-441152B15DE5}"/>
+                </a:ext>
+              </a:extLst>
+            </p:cNvPr>
+            <p:cNvSpPr txBox="1"/>
+            <p:nvPr/>
+          </p:nvSpPr>
+          <p:spPr>
+            <a:xfrm>
+              <a:off x="124951" y="3281194"/>
+              <a:ext cx="856325" cy="369332"/>
+            </a:xfrm>
+            <a:prstGeom prst="rect">
+              <a:avLst/>
+            </a:prstGeom>
+            <a:noFill/>
+          </p:spPr>
+          <p:txBody>
+            <a:bodyPr wrap="none" rtlCol="0">
+              <a:spAutoFit/>
+            </a:bodyPr>
+            <a:lstStyle/>
+            <a:p>
+              <a:r>
+                <a:rPr lang="en-US" dirty="0"/>
+                <a:t>Gln493</a:t>
+              </a:r>
+              <a:endParaRPr lang="en-GB" dirty="0"/>
+            </a:p>
+          </p:txBody>
+        </p:sp>
+        <p:cxnSp>
+          <p:nvCxnSpPr>
+            <p:cNvPr id="26" name="Straight Connector 25">
+              <a:extLst>
+                <a:ext uri="{FF2B5EF4-FFF2-40B4-BE49-F238E27FC236}">
+                  <a16:creationId xmlns:a16="http://schemas.microsoft.com/office/drawing/2014/main" id="{1157F7E1-756E-E97D-CFC8-E8111E7D2D57}"/>
+                </a:ext>
+              </a:extLst>
+            </p:cNvPr>
+            <p:cNvCxnSpPr>
+              <a:cxnSpLocks/>
+            </p:cNvCxnSpPr>
+            <p:nvPr/>
+          </p:nvCxnSpPr>
+          <p:spPr>
+            <a:xfrm flipV="1">
+              <a:off x="570746" y="3093856"/>
+              <a:ext cx="1173928" cy="187338"/>
+            </a:xfrm>
+            <a:prstGeom prst="line">
+              <a:avLst/>
+            </a:prstGeom>
+            <a:ln w="28575"/>
+          </p:spPr>
+          <p:style>
+            <a:lnRef idx="1">
+              <a:schemeClr val="accent1"/>
+            </a:lnRef>
+            <a:fillRef idx="0">
+              <a:schemeClr val="accent1"/>
+            </a:fillRef>
+            <a:effectRef idx="0">
+              <a:schemeClr val="accent1"/>
+            </a:effectRef>
+            <a:fontRef idx="minor">
+              <a:schemeClr val="tx1"/>
+            </a:fontRef>
+          </p:style>
+        </p:cxnSp>
+      </p:grpSp>
+      <p:grpSp>
+        <p:nvGrpSpPr>
+          <p:cNvPr id="46" name="Group 45">
+            <a:extLst>
+              <a:ext uri="{FF2B5EF4-FFF2-40B4-BE49-F238E27FC236}">
+                <a16:creationId xmlns:a16="http://schemas.microsoft.com/office/drawing/2014/main" id="{48791142-F531-3209-2015-1D389F1C7E25}"/>
+              </a:ext>
+            </a:extLst>
+          </p:cNvPr>
+          <p:cNvGrpSpPr/>
+          <p:nvPr/>
+        </p:nvGrpSpPr>
+        <p:grpSpPr>
+          <a:xfrm>
+            <a:off x="7319182" y="1807862"/>
+            <a:ext cx="4286820" cy="3242275"/>
+            <a:chOff x="7319182" y="1807862"/>
+            <a:chExt cx="4286820" cy="3242275"/>
           </a:xfrm>
         </p:grpSpPr>
         <p:grpSp>
           <p:nvGrpSpPr>
-            <p:cNvPr id="5" name="Group 4">
+            <p:cNvPr id="43" name="Group 42">
               <a:extLst>
                 <a:ext uri="{FF2B5EF4-FFF2-40B4-BE49-F238E27FC236}">
-                  <a16:creationId xmlns:a16="http://schemas.microsoft.com/office/drawing/2014/main" id="{7B905DD4-EC57-1C8A-D8F5-7A8332464449}"/>
+                  <a16:creationId xmlns:a16="http://schemas.microsoft.com/office/drawing/2014/main" id="{B2CBA774-CC79-B103-4475-9BC08B7D92DB}"/>
                 </a:ext>
               </a:extLst>
             </p:cNvPr>
@@ -4928,204 +6374,399 @@
           </p:nvGrpSpPr>
           <p:grpSpPr>
             <a:xfrm>
-              <a:off x="0" y="0"/>
-              <a:ext cx="4202430" cy="1696085"/>
-              <a:chOff x="0" y="0"/>
-              <a:chExt cx="5016401" cy="2025521"/>
+              <a:off x="7319182" y="1843901"/>
+              <a:ext cx="4250401" cy="2579622"/>
+              <a:chOff x="7285583" y="1849722"/>
+              <a:chExt cx="4250401" cy="2579622"/>
             </a:xfrm>
           </p:grpSpPr>
-          <p:pic>
-            <p:nvPicPr>
-              <p:cNvPr id="7" name="Picture 6">
+          <p:sp>
+            <p:nvSpPr>
+              <p:cNvPr id="31" name="TextBox 30">
                 <a:extLst>
                   <a:ext uri="{FF2B5EF4-FFF2-40B4-BE49-F238E27FC236}">
-                    <a16:creationId xmlns:a16="http://schemas.microsoft.com/office/drawing/2014/main" id="{BC10A549-14EE-F006-2D8D-4A6FC574E998}"/>
+                    <a16:creationId xmlns:a16="http://schemas.microsoft.com/office/drawing/2014/main" id="{6EF51BEE-5378-A1E2-4C8E-2AC2A061B3D0}"/>
                   </a:ext>
                 </a:extLst>
               </p:cNvPr>
-              <p:cNvPicPr>
-                <a:picLocks noChangeAspect="1"/>
-              </p:cNvPicPr>
+              <p:cNvSpPr txBox="1"/>
               <p:nvPr/>
-            </p:nvPicPr>
-            <p:blipFill>
-              <a:blip r:embed="rId2" cstate="print">
-                <a:extLst>
-                  <a:ext uri="{28A0092B-C50C-407E-A947-70E740481C1C}">
-                    <a14:useLocalDpi xmlns:a14="http://schemas.microsoft.com/office/drawing/2010/main" val="0"/>
-                  </a:ext>
-                </a:extLst>
-              </a:blip>
-              <a:srcRect/>
-              <a:stretch>
-                <a:fillRect/>
-              </a:stretch>
-            </p:blipFill>
-            <p:spPr bwMode="auto">
+            </p:nvSpPr>
+            <p:spPr>
               <a:xfrm>
-                <a:off x="0" y="110996"/>
-                <a:ext cx="2550160" cy="1914525"/>
+                <a:off x="7285583" y="3048704"/>
+                <a:ext cx="739305" cy="369332"/>
               </a:xfrm>
               <a:prstGeom prst="rect">
                 <a:avLst/>
               </a:prstGeom>
               <a:noFill/>
-              <a:ln>
-                <a:noFill/>
-              </a:ln>
             </p:spPr>
-          </p:pic>
-          <p:pic>
-            <p:nvPicPr>
-              <p:cNvPr id="8" name="Picture 7">
+            <p:txBody>
+              <a:bodyPr wrap="square" rtlCol="0">
+                <a:spAutoFit/>
+              </a:bodyPr>
+              <a:lstStyle/>
+              <a:p>
+                <a:r>
+                  <a:rPr lang="en-US" dirty="0"/>
+                  <a:t>Glu37</a:t>
+                </a:r>
+                <a:endParaRPr lang="en-GB" dirty="0"/>
+              </a:p>
+            </p:txBody>
+          </p:sp>
+          <p:cxnSp>
+            <p:nvCxnSpPr>
+              <p:cNvPr id="32" name="Straight Connector 31">
                 <a:extLst>
                   <a:ext uri="{FF2B5EF4-FFF2-40B4-BE49-F238E27FC236}">
-                    <a16:creationId xmlns:a16="http://schemas.microsoft.com/office/drawing/2014/main" id="{ADE565A5-CF5E-B28F-47C8-E7B96A1D5731}"/>
+                    <a16:creationId xmlns:a16="http://schemas.microsoft.com/office/drawing/2014/main" id="{429657ED-7BCA-9298-5B14-F6BB63E3EAE1}"/>
                   </a:ext>
                 </a:extLst>
               </p:cNvPr>
-              <p:cNvPicPr>
-                <a:picLocks noChangeAspect="1"/>
-              </p:cNvPicPr>
+              <p:cNvCxnSpPr>
+                <a:cxnSpLocks/>
+              </p:cNvCxnSpPr>
               <p:nvPr/>
-            </p:nvPicPr>
-            <p:blipFill>
-              <a:blip r:embed="rId3">
+            </p:nvCxnSpPr>
+            <p:spPr>
+              <a:xfrm flipH="1">
+                <a:off x="7993156" y="3093856"/>
+                <a:ext cx="981511" cy="73090"/>
+              </a:xfrm>
+              <a:prstGeom prst="line">
+                <a:avLst/>
+              </a:prstGeom>
+              <a:ln w="28575">
+                <a:solidFill>
+                  <a:srgbClr val="7A7A7A"/>
+                </a:solidFill>
+              </a:ln>
+            </p:spPr>
+            <p:style>
+              <a:lnRef idx="1">
+                <a:schemeClr val="accent1"/>
+              </a:lnRef>
+              <a:fillRef idx="0">
+                <a:schemeClr val="accent1"/>
+              </a:fillRef>
+              <a:effectRef idx="0">
+                <a:schemeClr val="accent1"/>
+              </a:effectRef>
+              <a:fontRef idx="minor">
+                <a:schemeClr val="tx1"/>
+              </a:fontRef>
+            </p:style>
+          </p:cxnSp>
+          <p:sp>
+            <p:nvSpPr>
+              <p:cNvPr id="33" name="TextBox 32">
                 <a:extLst>
-                  <a:ext uri="{28A0092B-C50C-407E-A947-70E740481C1C}">
-                    <a14:useLocalDpi xmlns:a14="http://schemas.microsoft.com/office/drawing/2010/main" val="0"/>
+                  <a:ext uri="{FF2B5EF4-FFF2-40B4-BE49-F238E27FC236}">
+                    <a16:creationId xmlns:a16="http://schemas.microsoft.com/office/drawing/2014/main" id="{6D29180A-4E0C-EFCD-2530-5E695CEA71DA}"/>
                   </a:ext>
                 </a:extLst>
-              </a:blip>
-              <a:srcRect/>
-              <a:stretch>
-                <a:fillRect/>
-              </a:stretch>
-            </p:blipFill>
-            <p:spPr bwMode="auto">
+              </p:cNvPr>
+              <p:cNvSpPr txBox="1"/>
+              <p:nvPr/>
+            </p:nvSpPr>
+            <p:spPr>
               <a:xfrm>
-                <a:off x="2463066" y="0"/>
-                <a:ext cx="2553335" cy="1915160"/>
+                <a:off x="9026777" y="1849722"/>
+                <a:ext cx="852462" cy="369332"/>
               </a:xfrm>
               <a:prstGeom prst="rect">
                 <a:avLst/>
               </a:prstGeom>
               <a:noFill/>
-              <a:ln>
-                <a:noFill/>
+            </p:spPr>
+            <p:txBody>
+              <a:bodyPr wrap="square" rtlCol="0">
+                <a:spAutoFit/>
+              </a:bodyPr>
+              <a:lstStyle/>
+              <a:p>
+                <a:r>
+                  <a:rPr lang="en-US" dirty="0"/>
+                  <a:t>Asp38</a:t>
+                </a:r>
+                <a:endParaRPr lang="en-GB" dirty="0"/>
+              </a:p>
+            </p:txBody>
+          </p:sp>
+          <p:sp>
+            <p:nvSpPr>
+              <p:cNvPr id="34" name="TextBox 33">
+                <a:extLst>
+                  <a:ext uri="{FF2B5EF4-FFF2-40B4-BE49-F238E27FC236}">
+                    <a16:creationId xmlns:a16="http://schemas.microsoft.com/office/drawing/2014/main" id="{1FB55078-C91E-B3C3-9EE8-F3C6E720ED91}"/>
+                  </a:ext>
+                </a:extLst>
+              </p:cNvPr>
+              <p:cNvSpPr txBox="1"/>
+              <p:nvPr/>
+            </p:nvSpPr>
+            <p:spPr>
+              <a:xfrm>
+                <a:off x="10683522" y="2787112"/>
+                <a:ext cx="852462" cy="369332"/>
+              </a:xfrm>
+              <a:prstGeom prst="rect">
+                <a:avLst/>
+              </a:prstGeom>
+              <a:noFill/>
+            </p:spPr>
+            <p:txBody>
+              <a:bodyPr wrap="square" rtlCol="0">
+                <a:spAutoFit/>
+              </a:bodyPr>
+              <a:lstStyle/>
+              <a:p>
+                <a:r>
+                  <a:rPr lang="en-US" dirty="0"/>
+                  <a:t>Gln42</a:t>
+                </a:r>
+                <a:endParaRPr lang="en-GB" dirty="0"/>
+              </a:p>
+            </p:txBody>
+          </p:sp>
+          <p:cxnSp>
+            <p:nvCxnSpPr>
+              <p:cNvPr id="36" name="Straight Connector 35">
+                <a:extLst>
+                  <a:ext uri="{FF2B5EF4-FFF2-40B4-BE49-F238E27FC236}">
+                    <a16:creationId xmlns:a16="http://schemas.microsoft.com/office/drawing/2014/main" id="{8030704B-F562-42BE-F560-017BBB97B9E1}"/>
+                  </a:ext>
+                </a:extLst>
+              </p:cNvPr>
+              <p:cNvCxnSpPr>
+                <a:cxnSpLocks/>
+              </p:cNvCxnSpPr>
+              <p:nvPr/>
+            </p:nvCxnSpPr>
+            <p:spPr>
+              <a:xfrm>
+                <a:off x="9461160" y="2207606"/>
+                <a:ext cx="179165" cy="501727"/>
+              </a:xfrm>
+              <a:prstGeom prst="line">
+                <a:avLst/>
+              </a:prstGeom>
+              <a:ln w="28575">
+                <a:solidFill>
+                  <a:srgbClr val="7A7A7A"/>
+                </a:solidFill>
               </a:ln>
             </p:spPr>
-          </p:pic>
+            <p:style>
+              <a:lnRef idx="1">
+                <a:schemeClr val="accent1"/>
+              </a:lnRef>
+              <a:fillRef idx="0">
+                <a:schemeClr val="accent1"/>
+              </a:fillRef>
+              <a:effectRef idx="0">
+                <a:schemeClr val="accent1"/>
+              </a:effectRef>
+              <a:fontRef idx="minor">
+                <a:schemeClr val="tx1"/>
+              </a:fontRef>
+            </p:style>
+          </p:cxnSp>
+          <p:sp>
+            <p:nvSpPr>
+              <p:cNvPr id="40" name="TextBox 39">
+                <a:extLst>
+                  <a:ext uri="{FF2B5EF4-FFF2-40B4-BE49-F238E27FC236}">
+                    <a16:creationId xmlns:a16="http://schemas.microsoft.com/office/drawing/2014/main" id="{BF82C8B8-0AF7-19A9-5C8A-A65DD3AE756A}"/>
+                  </a:ext>
+                </a:extLst>
+              </p:cNvPr>
+              <p:cNvSpPr txBox="1"/>
+              <p:nvPr/>
+            </p:nvSpPr>
+            <p:spPr>
+              <a:xfrm>
+                <a:off x="7415521" y="4060012"/>
+                <a:ext cx="891591" cy="369332"/>
+              </a:xfrm>
+              <a:prstGeom prst="rect">
+                <a:avLst/>
+              </a:prstGeom>
+              <a:noFill/>
+            </p:spPr>
+            <p:txBody>
+              <a:bodyPr wrap="square" rtlCol="0">
+                <a:spAutoFit/>
+              </a:bodyPr>
+              <a:lstStyle/>
+              <a:p>
+                <a:r>
+                  <a:rPr lang="en-US" dirty="0"/>
+                  <a:t>Gly496</a:t>
+                </a:r>
+                <a:endParaRPr lang="en-GB" dirty="0"/>
+              </a:p>
+            </p:txBody>
+          </p:sp>
+          <p:cxnSp>
+            <p:nvCxnSpPr>
+              <p:cNvPr id="41" name="Straight Connector 40">
+                <a:extLst>
+                  <a:ext uri="{FF2B5EF4-FFF2-40B4-BE49-F238E27FC236}">
+                    <a16:creationId xmlns:a16="http://schemas.microsoft.com/office/drawing/2014/main" id="{48E09799-CBF1-CECB-B0EC-151F893A6502}"/>
+                  </a:ext>
+                </a:extLst>
+              </p:cNvPr>
+              <p:cNvCxnSpPr>
+                <a:cxnSpLocks/>
+              </p:cNvCxnSpPr>
+              <p:nvPr/>
+            </p:nvCxnSpPr>
+            <p:spPr>
+              <a:xfrm flipV="1">
+                <a:off x="7861316" y="3810000"/>
+                <a:ext cx="1779009" cy="250012"/>
+              </a:xfrm>
+              <a:prstGeom prst="line">
+                <a:avLst/>
+              </a:prstGeom>
+              <a:ln w="28575"/>
+            </p:spPr>
+            <p:style>
+              <a:lnRef idx="1">
+                <a:schemeClr val="accent1"/>
+              </a:lnRef>
+              <a:fillRef idx="0">
+                <a:schemeClr val="accent1"/>
+              </a:fillRef>
+              <a:effectRef idx="0">
+                <a:schemeClr val="accent1"/>
+              </a:effectRef>
+              <a:fontRef idx="minor">
+                <a:schemeClr val="tx1"/>
+              </a:fontRef>
+            </p:style>
+          </p:cxnSp>
         </p:grpSp>
-        <p:sp>
-          <p:nvSpPr>
-            <p:cNvPr id="6" name="Text Box 1">
+        <p:pic>
+          <p:nvPicPr>
+            <p:cNvPr id="45" name="Picture 44">
               <a:extLst>
                 <a:ext uri="{FF2B5EF4-FFF2-40B4-BE49-F238E27FC236}">
-                  <a16:creationId xmlns:a16="http://schemas.microsoft.com/office/drawing/2014/main" id="{4CF87EA2-8913-EC20-2B28-B7FD8935C4F5}"/>
+                  <a16:creationId xmlns:a16="http://schemas.microsoft.com/office/drawing/2014/main" id="{0BC99961-0E6F-F9F3-F520-5FCFBB86C32F}"/>
                 </a:ext>
               </a:extLst>
             </p:cNvPr>
-            <p:cNvSpPr txBox="1"/>
+            <p:cNvPicPr>
+              <a:picLocks noChangeAspect="1"/>
+            </p:cNvPicPr>
             <p:nvPr/>
-          </p:nvSpPr>
+          </p:nvPicPr>
+          <p:blipFill>
+            <a:blip r:embed="rId4">
+              <a:extLst>
+                <a:ext uri="{28A0092B-C50C-407E-A947-70E740481C1C}">
+                  <a14:useLocalDpi xmlns:a14="http://schemas.microsoft.com/office/drawing/2010/main" val="0"/>
+                </a:ext>
+              </a:extLst>
+            </a:blip>
+            <a:stretch>
+              <a:fillRect/>
+            </a:stretch>
+          </p:blipFill>
           <p:spPr>
             <a:xfrm>
-              <a:off x="-36768" y="1630372"/>
-              <a:ext cx="4127340" cy="627244"/>
+              <a:off x="8428314" y="1807862"/>
+              <a:ext cx="3177688" cy="3242275"/>
             </a:xfrm>
             <a:prstGeom prst="rect">
               <a:avLst/>
             </a:prstGeom>
-            <a:solidFill>
-              <a:prstClr val="white"/>
-            </a:solidFill>
-            <a:ln>
-              <a:noFill/>
-            </a:ln>
           </p:spPr>
-          <p:txBody>
-            <a:bodyPr rot="0" spcFirstLastPara="0" vert="horz" wrap="square" lIns="0" tIns="0" rIns="0" bIns="0" numCol="1" spcCol="0" rtlCol="0" fromWordArt="0" anchor="t" anchorCtr="0" forceAA="0" compatLnSpc="1">
-              <a:prstTxWarp prst="textNoShape">
-                <a:avLst/>
-              </a:prstTxWarp>
-              <a:spAutoFit/>
-            </a:bodyPr>
-            <a:lstStyle/>
-            <a:p>
-              <a:pPr>
-                <a:spcAft>
-                  <a:spcPts val="1000"/>
-                </a:spcAft>
-              </a:pPr>
-              <a:r>
-                <a:rPr lang="en-GB" sz="2000" i="1" kern="100" dirty="0">
-                  <a:solidFill>
-                    <a:srgbClr val="44546A"/>
-                  </a:solidFill>
-                  <a:effectLst/>
-                  <a:latin typeface="Calibri" panose="020F0502020204030204" pitchFamily="34" charset="0"/>
-                  <a:ea typeface="DengXian" panose="02010600030101010101" pitchFamily="2" charset="-122"/>
-                  <a:cs typeface="Times New Roman" panose="02020603050405020304" pitchFamily="18" charset="0"/>
-                </a:rPr>
-                <a:t>Figure 1 Left: Illustration of adaptive MSM guided bias generation, color lines (blue to red): the biased free energy surface, black solid line: the original FES. Right: preliminary benchmark result on time needed for Na</a:t>
-              </a:r>
-              <a:r>
-                <a:rPr lang="en-GB" sz="2000" i="1" kern="100" baseline="30000" dirty="0">
-                  <a:solidFill>
-                    <a:srgbClr val="44546A"/>
-                  </a:solidFill>
-                  <a:effectLst/>
-                  <a:latin typeface="Calibri" panose="020F0502020204030204" pitchFamily="34" charset="0"/>
-                  <a:ea typeface="DengXian" panose="02010600030101010101" pitchFamily="2" charset="-122"/>
-                  <a:cs typeface="Times New Roman" panose="02020603050405020304" pitchFamily="18" charset="0"/>
-                </a:rPr>
-                <a:t>+</a:t>
-              </a:r>
-              <a:r>
-                <a:rPr lang="en-GB" sz="2000" i="1" kern="100" dirty="0">
-                  <a:solidFill>
-                    <a:srgbClr val="44546A"/>
-                  </a:solidFill>
-                  <a:effectLst/>
-                  <a:latin typeface="Calibri" panose="020F0502020204030204" pitchFamily="34" charset="0"/>
-                  <a:ea typeface="DengXian" panose="02010600030101010101" pitchFamily="2" charset="-122"/>
-                  <a:cs typeface="Times New Roman" panose="02020603050405020304" pitchFamily="18" charset="0"/>
-                </a:rPr>
-                <a:t>-Cl</a:t>
-              </a:r>
-              <a:r>
-                <a:rPr lang="en-GB" sz="2000" i="1" kern="100" baseline="30000" dirty="0">
-                  <a:solidFill>
-                    <a:srgbClr val="44546A"/>
-                  </a:solidFill>
-                  <a:effectLst/>
-                  <a:latin typeface="Calibri" panose="020F0502020204030204" pitchFamily="34" charset="0"/>
-                  <a:ea typeface="DengXian" panose="02010600030101010101" pitchFamily="2" charset="-122"/>
-                  <a:cs typeface="Times New Roman" panose="02020603050405020304" pitchFamily="18" charset="0"/>
-                </a:rPr>
-                <a:t>-</a:t>
-              </a:r>
-              <a:r>
-                <a:rPr lang="en-GB" sz="2000" i="1" kern="100" dirty="0">
-                  <a:solidFill>
-                    <a:srgbClr val="44546A"/>
-                  </a:solidFill>
-                  <a:effectLst/>
-                  <a:latin typeface="Calibri" panose="020F0502020204030204" pitchFamily="34" charset="0"/>
-                  <a:ea typeface="DengXian" panose="02010600030101010101" pitchFamily="2" charset="-122"/>
-                  <a:cs typeface="Times New Roman" panose="02020603050405020304" pitchFamily="18" charset="0"/>
-                </a:rPr>
-                <a:t> ion pair separation task.</a:t>
-              </a:r>
-            </a:p>
-          </p:txBody>
-        </p:sp>
+        </p:pic>
       </p:grpSp>
+      <p:sp>
+        <p:nvSpPr>
+          <p:cNvPr id="47" name="TextBox 46">
+            <a:extLst>
+              <a:ext uri="{FF2B5EF4-FFF2-40B4-BE49-F238E27FC236}">
+                <a16:creationId xmlns:a16="http://schemas.microsoft.com/office/drawing/2014/main" id="{3D77240B-8067-0DC7-4365-126B48F37F8E}"/>
+              </a:ext>
+            </a:extLst>
+          </p:cNvPr>
+          <p:cNvSpPr txBox="1"/>
+          <p:nvPr/>
+        </p:nvSpPr>
+        <p:spPr>
+          <a:xfrm>
+            <a:off x="11355525" y="3546422"/>
+            <a:ext cx="891591" cy="369332"/>
+          </a:xfrm>
+          <a:prstGeom prst="rect">
+            <a:avLst/>
+          </a:prstGeom>
+          <a:noFill/>
+        </p:spPr>
+        <p:txBody>
+          <a:bodyPr wrap="square" rtlCol="0">
+            <a:spAutoFit/>
+          </a:bodyPr>
+          <a:lstStyle/>
+          <a:p>
+            <a:r>
+              <a:rPr lang="en-US" dirty="0"/>
+              <a:t>Gln498</a:t>
+            </a:r>
+            <a:endParaRPr lang="en-GB" dirty="0"/>
+          </a:p>
+        </p:txBody>
+      </p:sp>
+      <p:cxnSp>
+        <p:nvCxnSpPr>
+          <p:cNvPr id="48" name="Straight Connector 47">
+            <a:extLst>
+              <a:ext uri="{FF2B5EF4-FFF2-40B4-BE49-F238E27FC236}">
+                <a16:creationId xmlns:a16="http://schemas.microsoft.com/office/drawing/2014/main" id="{88D2B7BA-8CE9-5BC8-93DF-FF8092C6001A}"/>
+              </a:ext>
+            </a:extLst>
+          </p:cNvPr>
+          <p:cNvCxnSpPr>
+            <a:cxnSpLocks/>
+            <a:stCxn id="47" idx="1"/>
+          </p:cNvCxnSpPr>
+          <p:nvPr/>
+        </p:nvCxnSpPr>
+        <p:spPr>
+          <a:xfrm flipH="1" flipV="1">
+            <a:off x="10606695" y="3386049"/>
+            <a:ext cx="748830" cy="345039"/>
+          </a:xfrm>
+          <a:prstGeom prst="line">
+            <a:avLst/>
+          </a:prstGeom>
+          <a:ln w="28575"/>
+        </p:spPr>
+        <p:style>
+          <a:lnRef idx="1">
+            <a:schemeClr val="accent1"/>
+          </a:lnRef>
+          <a:fillRef idx="0">
+            <a:schemeClr val="accent1"/>
+          </a:fillRef>
+          <a:effectRef idx="0">
+            <a:schemeClr val="accent1"/>
+          </a:effectRef>
+          <a:fontRef idx="minor">
+            <a:schemeClr val="tx1"/>
+          </a:fontRef>
+        </p:style>
+      </p:cxnSp>
     </p:spTree>
     <p:extLst>
       <p:ext uri="{BB962C8B-B14F-4D97-AF65-F5344CB8AC3E}">
-        <p14:creationId xmlns:p14="http://schemas.microsoft.com/office/powerpoint/2010/main" val="2496283995"/>
+        <p14:creationId xmlns:p14="http://schemas.microsoft.com/office/powerpoint/2010/main" val="3805829568"/>
       </p:ext>
     </p:extLst>
   </p:cSld>

</xml_diff>